<commit_message>
final measurements and powerpoint
</commit_message>
<xml_diff>
--- a/Bloom filter.pptx
+++ b/Bloom filter.pptx
@@ -5,7 +5,7 @@
     <p:sldMasterId id="2147483648" r:id="rId1"/>
   </p:sldMasterIdLst>
   <p:notesMasterIdLst>
-    <p:notesMasterId r:id="rId13"/>
+    <p:notesMasterId r:id="rId17"/>
   </p:notesMasterIdLst>
   <p:sldIdLst>
     <p:sldId id="257" r:id="rId2"/>
@@ -18,7 +18,11 @@
     <p:sldId id="289" r:id="rId9"/>
     <p:sldId id="290" r:id="rId10"/>
     <p:sldId id="291" r:id="rId11"/>
-    <p:sldId id="284" r:id="rId12"/>
+    <p:sldId id="294" r:id="rId12"/>
+    <p:sldId id="295" r:id="rId13"/>
+    <p:sldId id="292" r:id="rId14"/>
+    <p:sldId id="293" r:id="rId15"/>
+    <p:sldId id="284" r:id="rId16"/>
   </p:sldIdLst>
   <p:sldSz cx="12192000" cy="6858000"/>
   <p:notesSz cx="6858000" cy="9144000"/>
@@ -117,7 +121,2123 @@
       </a:defRPr>
     </a:lvl9pPr>
   </p:defaultTextStyle>
+  <p:extLst>
+    <p:ext uri="{EFAFB233-063F-42B5-8137-9DF3F51BA10A}">
+      <p15:sldGuideLst xmlns:p15="http://schemas.microsoft.com/office/powerpoint/2012/main"/>
+    </p:ext>
+  </p:extLst>
 </p:presentation>
+</file>
+
+<file path=ppt/charts/chart1.xml><?xml version="1.0" encoding="utf-8"?>
+<c:chartSpace xmlns:c="http://schemas.openxmlformats.org/drawingml/2006/chart" xmlns:a="http://schemas.openxmlformats.org/drawingml/2006/main" xmlns:r="http://schemas.openxmlformats.org/officeDocument/2006/relationships">
+  <c:date1904 val="0"/>
+  <c:lang val="en-US"/>
+  <c:roundedCorners val="0"/>
+  <mc:AlternateContent xmlns:mc="http://schemas.openxmlformats.org/markup-compatibility/2006">
+    <mc:Choice xmlns:c14="http://schemas.microsoft.com/office/drawing/2007/8/2/chart" Requires="c14">
+      <c14:style val="102"/>
+    </mc:Choice>
+    <mc:Fallback>
+      <c:style val="2"/>
+    </mc:Fallback>
+  </mc:AlternateContent>
+  <c:chart>
+    <c:autoTitleDeleted val="1"/>
+    <c:plotArea>
+      <c:layout/>
+      <c:barChart>
+        <c:barDir val="col"/>
+        <c:grouping val="clustered"/>
+        <c:varyColors val="0"/>
+        <c:ser>
+          <c:idx val="2"/>
+          <c:order val="0"/>
+          <c:tx>
+            <c:v>C</c:v>
+          </c:tx>
+          <c:spPr>
+            <a:solidFill>
+              <a:schemeClr val="accent3"/>
+            </a:solidFill>
+            <a:ln>
+              <a:noFill/>
+            </a:ln>
+            <a:effectLst/>
+          </c:spPr>
+          <c:invertIfNegative val="0"/>
+          <c:cat>
+            <c:strRef>
+              <c:f>(Sheet1!$L$3,Sheet1!$N$3)</c:f>
+              <c:strCache>
+                <c:ptCount val="2"/>
+                <c:pt idx="0">
+                  <c:v>Dodavanje [ms]</c:v>
+                </c:pt>
+                <c:pt idx="1">
+                  <c:v>Provjera [ms]</c:v>
+                </c:pt>
+              </c:strCache>
+            </c:strRef>
+          </c:cat>
+          <c:val>
+            <c:numRef>
+              <c:f>(Sheet1!$P$8,Sheet1!$R$8)</c:f>
+              <c:numCache>
+                <c:formatCode>#,##0.00</c:formatCode>
+                <c:ptCount val="2"/>
+                <c:pt idx="0">
+                  <c:v>182.66200000000001</c:v>
+                </c:pt>
+                <c:pt idx="1">
+                  <c:v>492.71499999999997</c:v>
+                </c:pt>
+              </c:numCache>
+            </c:numRef>
+          </c:val>
+        </c:ser>
+        <c:ser>
+          <c:idx val="1"/>
+          <c:order val="1"/>
+          <c:tx>
+            <c:v>Java (Damir)</c:v>
+          </c:tx>
+          <c:spPr>
+            <a:solidFill>
+              <a:schemeClr val="accent2"/>
+            </a:solidFill>
+            <a:ln>
+              <a:noFill/>
+            </a:ln>
+            <a:effectLst/>
+          </c:spPr>
+          <c:invertIfNegative val="0"/>
+          <c:cat>
+            <c:strRef>
+              <c:f>(Sheet1!$L$3,Sheet1!$N$3)</c:f>
+              <c:strCache>
+                <c:ptCount val="2"/>
+                <c:pt idx="0">
+                  <c:v>Dodavanje [ms]</c:v>
+                </c:pt>
+                <c:pt idx="1">
+                  <c:v>Provjera [ms]</c:v>
+                </c:pt>
+              </c:strCache>
+            </c:strRef>
+          </c:cat>
+          <c:val>
+            <c:numRef>
+              <c:f>(Sheet1!$H$8,Sheet1!$J$8)</c:f>
+              <c:numCache>
+                <c:formatCode>#,##0.00</c:formatCode>
+                <c:ptCount val="2"/>
+                <c:pt idx="0">
+                  <c:v>569</c:v>
+                </c:pt>
+                <c:pt idx="1">
+                  <c:v>1256</c:v>
+                </c:pt>
+              </c:numCache>
+            </c:numRef>
+          </c:val>
+        </c:ser>
+        <c:ser>
+          <c:idx val="3"/>
+          <c:order val="2"/>
+          <c:tx>
+            <c:v>C#</c:v>
+          </c:tx>
+          <c:spPr>
+            <a:solidFill>
+              <a:schemeClr val="accent4"/>
+            </a:solidFill>
+            <a:ln>
+              <a:noFill/>
+            </a:ln>
+            <a:effectLst/>
+          </c:spPr>
+          <c:invertIfNegative val="0"/>
+          <c:cat>
+            <c:strRef>
+              <c:f>(Sheet1!$L$3,Sheet1!$N$3)</c:f>
+              <c:strCache>
+                <c:ptCount val="2"/>
+                <c:pt idx="0">
+                  <c:v>Dodavanje [ms]</c:v>
+                </c:pt>
+                <c:pt idx="1">
+                  <c:v>Provjera [ms]</c:v>
+                </c:pt>
+              </c:strCache>
+            </c:strRef>
+          </c:cat>
+          <c:val>
+            <c:numRef>
+              <c:f>(Sheet1!$T$8,Sheet1!$V$8)</c:f>
+              <c:numCache>
+                <c:formatCode>#,##0.00</c:formatCode>
+                <c:ptCount val="2"/>
+                <c:pt idx="0">
+                  <c:v>654.82000000000005</c:v>
+                </c:pt>
+                <c:pt idx="1">
+                  <c:v>1781.08</c:v>
+                </c:pt>
+              </c:numCache>
+            </c:numRef>
+          </c:val>
+        </c:ser>
+        <c:ser>
+          <c:idx val="4"/>
+          <c:order val="3"/>
+          <c:tx>
+            <c:v>Java (Filip)</c:v>
+          </c:tx>
+          <c:spPr>
+            <a:solidFill>
+              <a:schemeClr val="accent5"/>
+            </a:solidFill>
+            <a:ln>
+              <a:noFill/>
+            </a:ln>
+            <a:effectLst/>
+          </c:spPr>
+          <c:invertIfNegative val="0"/>
+          <c:cat>
+            <c:strRef>
+              <c:f>(Sheet1!$L$3,Sheet1!$N$3)</c:f>
+              <c:strCache>
+                <c:ptCount val="2"/>
+                <c:pt idx="0">
+                  <c:v>Dodavanje [ms]</c:v>
+                </c:pt>
+                <c:pt idx="1">
+                  <c:v>Provjera [ms]</c:v>
+                </c:pt>
+              </c:strCache>
+            </c:strRef>
+          </c:cat>
+          <c:val>
+            <c:numRef>
+              <c:f>(Sheet1!$L$8,Sheet1!$N$8)</c:f>
+              <c:numCache>
+                <c:formatCode>#,##0.00</c:formatCode>
+                <c:ptCount val="2"/>
+                <c:pt idx="0">
+                  <c:v>873</c:v>
+                </c:pt>
+                <c:pt idx="1">
+                  <c:v>1766</c:v>
+                </c:pt>
+              </c:numCache>
+            </c:numRef>
+          </c:val>
+        </c:ser>
+        <c:ser>
+          <c:idx val="0"/>
+          <c:order val="4"/>
+          <c:tx>
+            <c:v>Python</c:v>
+          </c:tx>
+          <c:spPr>
+            <a:solidFill>
+              <a:schemeClr val="accent1"/>
+            </a:solidFill>
+            <a:ln>
+              <a:noFill/>
+            </a:ln>
+            <a:effectLst/>
+          </c:spPr>
+          <c:invertIfNegative val="0"/>
+          <c:cat>
+            <c:strRef>
+              <c:f>(Sheet1!$L$3,Sheet1!$N$3)</c:f>
+              <c:strCache>
+                <c:ptCount val="2"/>
+                <c:pt idx="0">
+                  <c:v>Dodavanje [ms]</c:v>
+                </c:pt>
+                <c:pt idx="1">
+                  <c:v>Provjera [ms]</c:v>
+                </c:pt>
+              </c:strCache>
+            </c:strRef>
+          </c:cat>
+          <c:val>
+            <c:numRef>
+              <c:f>(Sheet1!$D$8,Sheet1!$F$8)</c:f>
+              <c:numCache>
+                <c:formatCode>#,##0.00</c:formatCode>
+                <c:ptCount val="2"/>
+                <c:pt idx="0">
+                  <c:v>4720.0767999999998</c:v>
+                </c:pt>
+                <c:pt idx="1">
+                  <c:v>11594.1564</c:v>
+                </c:pt>
+              </c:numCache>
+            </c:numRef>
+          </c:val>
+        </c:ser>
+        <c:dLbls>
+          <c:showLegendKey val="0"/>
+          <c:showVal val="0"/>
+          <c:showCatName val="0"/>
+          <c:showSerName val="0"/>
+          <c:showPercent val="0"/>
+          <c:showBubbleSize val="0"/>
+        </c:dLbls>
+        <c:gapWidth val="150"/>
+        <c:axId val="-1713983424"/>
+        <c:axId val="-1713983968"/>
+      </c:barChart>
+      <c:catAx>
+        <c:axId val="-1713983424"/>
+        <c:scaling>
+          <c:orientation val="minMax"/>
+        </c:scaling>
+        <c:delete val="0"/>
+        <c:axPos val="b"/>
+        <c:numFmt formatCode="General" sourceLinked="1"/>
+        <c:majorTickMark val="none"/>
+        <c:minorTickMark val="none"/>
+        <c:tickLblPos val="nextTo"/>
+        <c:spPr>
+          <a:noFill/>
+          <a:ln w="9525" cap="flat" cmpd="sng" algn="ctr">
+            <a:solidFill>
+              <a:schemeClr val="tx1">
+                <a:lumMod val="15000"/>
+                <a:lumOff val="85000"/>
+              </a:schemeClr>
+            </a:solidFill>
+            <a:round/>
+          </a:ln>
+          <a:effectLst/>
+        </c:spPr>
+        <c:txPr>
+          <a:bodyPr rot="-60000000" spcFirstLastPara="1" vertOverflow="ellipsis" vert="horz" wrap="square" anchor="ctr" anchorCtr="1"/>
+          <a:lstStyle/>
+          <a:p>
+            <a:pPr>
+              <a:defRPr sz="900" b="0" i="0" u="none" strike="noStrike" kern="1200" baseline="0">
+                <a:solidFill>
+                  <a:schemeClr val="tx1">
+                    <a:lumMod val="65000"/>
+                    <a:lumOff val="35000"/>
+                  </a:schemeClr>
+                </a:solidFill>
+                <a:latin typeface="+mn-lt"/>
+                <a:ea typeface="+mn-ea"/>
+                <a:cs typeface="+mn-cs"/>
+              </a:defRPr>
+            </a:pPr>
+            <a:endParaRPr lang="sr-Latn-RS"/>
+          </a:p>
+        </c:txPr>
+        <c:crossAx val="-1713983968"/>
+        <c:crosses val="autoZero"/>
+        <c:auto val="1"/>
+        <c:lblAlgn val="ctr"/>
+        <c:lblOffset val="100"/>
+        <c:noMultiLvlLbl val="0"/>
+      </c:catAx>
+      <c:valAx>
+        <c:axId val="-1713983968"/>
+        <c:scaling>
+          <c:logBase val="10"/>
+          <c:orientation val="minMax"/>
+        </c:scaling>
+        <c:delete val="0"/>
+        <c:axPos val="l"/>
+        <c:majorGridlines>
+          <c:spPr>
+            <a:ln w="9525" cap="flat" cmpd="sng" algn="ctr">
+              <a:solidFill>
+                <a:schemeClr val="tx1">
+                  <a:lumMod val="15000"/>
+                  <a:lumOff val="85000"/>
+                </a:schemeClr>
+              </a:solidFill>
+              <a:round/>
+            </a:ln>
+            <a:effectLst/>
+          </c:spPr>
+        </c:majorGridlines>
+        <c:title>
+          <c:tx>
+            <c:rich>
+              <a:bodyPr rot="-5400000" spcFirstLastPara="1" vertOverflow="ellipsis" vert="horz" wrap="square" anchor="ctr" anchorCtr="1"/>
+              <a:lstStyle/>
+              <a:p>
+                <a:pPr>
+                  <a:defRPr sz="1000" b="0" i="0" u="none" strike="noStrike" kern="1200" baseline="0">
+                    <a:solidFill>
+                      <a:schemeClr val="tx1">
+                        <a:lumMod val="65000"/>
+                        <a:lumOff val="35000"/>
+                      </a:schemeClr>
+                    </a:solidFill>
+                    <a:latin typeface="+mn-lt"/>
+                    <a:ea typeface="+mn-ea"/>
+                    <a:cs typeface="+mn-cs"/>
+                  </a:defRPr>
+                </a:pPr>
+                <a:r>
+                  <a:rPr lang="en-GB"/>
+                  <a:t>Vrijeme [ms]</a:t>
+                </a:r>
+                <a:endParaRPr lang="hr-HR"/>
+              </a:p>
+            </c:rich>
+          </c:tx>
+          <c:layout/>
+          <c:overlay val="0"/>
+          <c:spPr>
+            <a:noFill/>
+            <a:ln>
+              <a:noFill/>
+            </a:ln>
+            <a:effectLst/>
+          </c:spPr>
+          <c:txPr>
+            <a:bodyPr rot="-5400000" spcFirstLastPara="1" vertOverflow="ellipsis" vert="horz" wrap="square" anchor="ctr" anchorCtr="1"/>
+            <a:lstStyle/>
+            <a:p>
+              <a:pPr>
+                <a:defRPr sz="1000" b="0" i="0" u="none" strike="noStrike" kern="1200" baseline="0">
+                  <a:solidFill>
+                    <a:schemeClr val="tx1">
+                      <a:lumMod val="65000"/>
+                      <a:lumOff val="35000"/>
+                    </a:schemeClr>
+                  </a:solidFill>
+                  <a:latin typeface="+mn-lt"/>
+                  <a:ea typeface="+mn-ea"/>
+                  <a:cs typeface="+mn-cs"/>
+                </a:defRPr>
+              </a:pPr>
+              <a:endParaRPr lang="sr-Latn-RS"/>
+            </a:p>
+          </c:txPr>
+        </c:title>
+        <c:numFmt formatCode="#,##0.00" sourceLinked="1"/>
+        <c:majorTickMark val="none"/>
+        <c:minorTickMark val="none"/>
+        <c:tickLblPos val="nextTo"/>
+        <c:spPr>
+          <a:noFill/>
+          <a:ln>
+            <a:noFill/>
+          </a:ln>
+          <a:effectLst/>
+        </c:spPr>
+        <c:txPr>
+          <a:bodyPr rot="-60000000" spcFirstLastPara="1" vertOverflow="ellipsis" vert="horz" wrap="square" anchor="ctr" anchorCtr="1"/>
+          <a:lstStyle/>
+          <a:p>
+            <a:pPr>
+              <a:defRPr sz="900" b="0" i="0" u="none" strike="noStrike" kern="1200" baseline="0">
+                <a:solidFill>
+                  <a:schemeClr val="tx1">
+                    <a:lumMod val="65000"/>
+                    <a:lumOff val="35000"/>
+                  </a:schemeClr>
+                </a:solidFill>
+                <a:latin typeface="+mn-lt"/>
+                <a:ea typeface="+mn-ea"/>
+                <a:cs typeface="+mn-cs"/>
+              </a:defRPr>
+            </a:pPr>
+            <a:endParaRPr lang="sr-Latn-RS"/>
+          </a:p>
+        </c:txPr>
+        <c:crossAx val="-1713983424"/>
+        <c:crosses val="autoZero"/>
+        <c:crossBetween val="between"/>
+      </c:valAx>
+      <c:dTable>
+        <c:showHorzBorder val="1"/>
+        <c:showVertBorder val="1"/>
+        <c:showOutline val="1"/>
+        <c:showKeys val="1"/>
+        <c:spPr>
+          <a:noFill/>
+          <a:ln w="9525" cap="flat" cmpd="sng" algn="ctr">
+            <a:solidFill>
+              <a:schemeClr val="tx1">
+                <a:lumMod val="15000"/>
+                <a:lumOff val="85000"/>
+              </a:schemeClr>
+            </a:solidFill>
+            <a:round/>
+          </a:ln>
+          <a:effectLst/>
+        </c:spPr>
+        <c:txPr>
+          <a:bodyPr rot="0" spcFirstLastPara="1" vertOverflow="ellipsis" vert="horz" wrap="square" anchor="ctr" anchorCtr="1"/>
+          <a:lstStyle/>
+          <a:p>
+            <a:pPr rtl="0">
+              <a:defRPr sz="900" b="0" i="0" u="none" strike="noStrike" kern="1200" baseline="0">
+                <a:solidFill>
+                  <a:schemeClr val="tx1">
+                    <a:lumMod val="65000"/>
+                    <a:lumOff val="35000"/>
+                  </a:schemeClr>
+                </a:solidFill>
+                <a:latin typeface="+mn-lt"/>
+                <a:ea typeface="+mn-ea"/>
+                <a:cs typeface="+mn-cs"/>
+              </a:defRPr>
+            </a:pPr>
+            <a:endParaRPr lang="sr-Latn-RS"/>
+          </a:p>
+        </c:txPr>
+      </c:dTable>
+      <c:spPr>
+        <a:noFill/>
+        <a:ln>
+          <a:noFill/>
+        </a:ln>
+        <a:effectLst/>
+      </c:spPr>
+    </c:plotArea>
+    <c:plotVisOnly val="1"/>
+    <c:dispBlanksAs val="gap"/>
+    <c:showDLblsOverMax val="0"/>
+  </c:chart>
+  <c:spPr>
+    <a:noFill/>
+    <a:ln>
+      <a:noFill/>
+    </a:ln>
+    <a:effectLst/>
+  </c:spPr>
+  <c:txPr>
+    <a:bodyPr/>
+    <a:lstStyle/>
+    <a:p>
+      <a:pPr>
+        <a:defRPr/>
+      </a:pPr>
+      <a:endParaRPr lang="sr-Latn-RS"/>
+    </a:p>
+  </c:txPr>
+  <c:externalData r:id="rId3">
+    <c:autoUpdate val="0"/>
+  </c:externalData>
+</c:chartSpace>
+</file>
+
+<file path=ppt/charts/chart2.xml><?xml version="1.0" encoding="utf-8"?>
+<c:chartSpace xmlns:c="http://schemas.openxmlformats.org/drawingml/2006/chart" xmlns:a="http://schemas.openxmlformats.org/drawingml/2006/main" xmlns:r="http://schemas.openxmlformats.org/officeDocument/2006/relationships">
+  <c:date1904 val="0"/>
+  <c:lang val="en-US"/>
+  <c:roundedCorners val="0"/>
+  <mc:AlternateContent xmlns:mc="http://schemas.openxmlformats.org/markup-compatibility/2006">
+    <mc:Choice xmlns:c14="http://schemas.microsoft.com/office/drawing/2007/8/2/chart" Requires="c14">
+      <c14:style val="102"/>
+    </mc:Choice>
+    <mc:Fallback>
+      <c:style val="2"/>
+    </mc:Fallback>
+  </mc:AlternateContent>
+  <c:chart>
+    <c:autoTitleDeleted val="1"/>
+    <c:view3D>
+      <c:rotX val="15"/>
+      <c:rotY val="20"/>
+      <c:depthPercent val="100"/>
+      <c:rAngAx val="1"/>
+    </c:view3D>
+    <c:floor>
+      <c:thickness val="0"/>
+      <c:spPr>
+        <a:noFill/>
+        <a:ln>
+          <a:noFill/>
+        </a:ln>
+        <a:effectLst/>
+        <a:sp3d/>
+      </c:spPr>
+    </c:floor>
+    <c:sideWall>
+      <c:thickness val="0"/>
+      <c:spPr>
+        <a:noFill/>
+        <a:ln>
+          <a:noFill/>
+        </a:ln>
+        <a:effectLst/>
+        <a:sp3d/>
+      </c:spPr>
+    </c:sideWall>
+    <c:backWall>
+      <c:thickness val="0"/>
+      <c:spPr>
+        <a:noFill/>
+        <a:ln>
+          <a:noFill/>
+        </a:ln>
+        <a:effectLst/>
+        <a:sp3d/>
+      </c:spPr>
+    </c:backWall>
+    <c:plotArea>
+      <c:layout/>
+      <c:bar3DChart>
+        <c:barDir val="col"/>
+        <c:grouping val="clustered"/>
+        <c:varyColors val="0"/>
+        <c:ser>
+          <c:idx val="2"/>
+          <c:order val="0"/>
+          <c:tx>
+            <c:v>C</c:v>
+          </c:tx>
+          <c:spPr>
+            <a:solidFill>
+              <a:schemeClr val="accent3"/>
+            </a:solidFill>
+            <a:ln>
+              <a:noFill/>
+            </a:ln>
+            <a:effectLst/>
+            <a:sp3d/>
+          </c:spPr>
+          <c:invertIfNegative val="0"/>
+          <c:cat>
+            <c:strRef>
+              <c:f>Sheet1!$M$3</c:f>
+              <c:strCache>
+                <c:ptCount val="1"/>
+                <c:pt idx="0">
+                  <c:v>Memorija [byte]</c:v>
+                </c:pt>
+              </c:strCache>
+            </c:strRef>
+          </c:cat>
+          <c:val>
+            <c:numRef>
+              <c:f>Sheet1!$Q$8</c:f>
+              <c:numCache>
+                <c:formatCode>#,##0</c:formatCode>
+                <c:ptCount val="1"/>
+                <c:pt idx="0">
+                  <c:v>1508000</c:v>
+                </c:pt>
+              </c:numCache>
+            </c:numRef>
+          </c:val>
+        </c:ser>
+        <c:ser>
+          <c:idx val="0"/>
+          <c:order val="1"/>
+          <c:tx>
+            <c:v>Python</c:v>
+          </c:tx>
+          <c:spPr>
+            <a:solidFill>
+              <a:schemeClr val="accent1"/>
+            </a:solidFill>
+            <a:ln>
+              <a:noFill/>
+            </a:ln>
+            <a:effectLst/>
+            <a:sp3d/>
+          </c:spPr>
+          <c:invertIfNegative val="0"/>
+          <c:cat>
+            <c:strRef>
+              <c:f>Sheet1!$M$3</c:f>
+              <c:strCache>
+                <c:ptCount val="1"/>
+                <c:pt idx="0">
+                  <c:v>Memorija [byte]</c:v>
+                </c:pt>
+              </c:strCache>
+            </c:strRef>
+          </c:cat>
+          <c:val>
+            <c:numRef>
+              <c:f>Sheet1!$E$8</c:f>
+              <c:numCache>
+                <c:formatCode>#,##0</c:formatCode>
+                <c:ptCount val="1"/>
+                <c:pt idx="0">
+                  <c:v>13584000</c:v>
+                </c:pt>
+              </c:numCache>
+            </c:numRef>
+          </c:val>
+        </c:ser>
+        <c:ser>
+          <c:idx val="3"/>
+          <c:order val="2"/>
+          <c:tx>
+            <c:v>C#</c:v>
+          </c:tx>
+          <c:spPr>
+            <a:solidFill>
+              <a:schemeClr val="accent4"/>
+            </a:solidFill>
+            <a:ln>
+              <a:noFill/>
+            </a:ln>
+            <a:effectLst/>
+            <a:sp3d/>
+          </c:spPr>
+          <c:invertIfNegative val="0"/>
+          <c:cat>
+            <c:strRef>
+              <c:f>Sheet1!$M$3</c:f>
+              <c:strCache>
+                <c:ptCount val="1"/>
+                <c:pt idx="0">
+                  <c:v>Memorija [byte]</c:v>
+                </c:pt>
+              </c:strCache>
+            </c:strRef>
+          </c:cat>
+          <c:val>
+            <c:numRef>
+              <c:f>Sheet1!$U$8</c:f>
+              <c:numCache>
+                <c:formatCode>#,##0</c:formatCode>
+                <c:ptCount val="1"/>
+                <c:pt idx="0">
+                  <c:v>18720000</c:v>
+                </c:pt>
+              </c:numCache>
+            </c:numRef>
+          </c:val>
+        </c:ser>
+        <c:ser>
+          <c:idx val="1"/>
+          <c:order val="3"/>
+          <c:tx>
+            <c:v>Java (Damir)</c:v>
+          </c:tx>
+          <c:spPr>
+            <a:solidFill>
+              <a:schemeClr val="accent2"/>
+            </a:solidFill>
+            <a:ln>
+              <a:noFill/>
+            </a:ln>
+            <a:effectLst/>
+            <a:sp3d/>
+          </c:spPr>
+          <c:invertIfNegative val="0"/>
+          <c:cat>
+            <c:strRef>
+              <c:f>Sheet1!$M$3</c:f>
+              <c:strCache>
+                <c:ptCount val="1"/>
+                <c:pt idx="0">
+                  <c:v>Memorija [byte]</c:v>
+                </c:pt>
+              </c:strCache>
+            </c:strRef>
+          </c:cat>
+          <c:val>
+            <c:numRef>
+              <c:f>Sheet1!$I$8</c:f>
+              <c:numCache>
+                <c:formatCode>#,##0</c:formatCode>
+                <c:ptCount val="1"/>
+                <c:pt idx="0">
+                  <c:v>197996000</c:v>
+                </c:pt>
+              </c:numCache>
+            </c:numRef>
+          </c:val>
+        </c:ser>
+        <c:ser>
+          <c:idx val="4"/>
+          <c:order val="4"/>
+          <c:tx>
+            <c:v>Java (Filip)</c:v>
+          </c:tx>
+          <c:spPr>
+            <a:solidFill>
+              <a:schemeClr val="accent5"/>
+            </a:solidFill>
+            <a:ln>
+              <a:noFill/>
+            </a:ln>
+            <a:effectLst/>
+            <a:sp3d/>
+          </c:spPr>
+          <c:invertIfNegative val="0"/>
+          <c:cat>
+            <c:strRef>
+              <c:f>Sheet1!$M$3</c:f>
+              <c:strCache>
+                <c:ptCount val="1"/>
+                <c:pt idx="0">
+                  <c:v>Memorija [byte]</c:v>
+                </c:pt>
+              </c:strCache>
+            </c:strRef>
+          </c:cat>
+          <c:val>
+            <c:numRef>
+              <c:f>Sheet1!$M$8</c:f>
+              <c:numCache>
+                <c:formatCode>#,##0</c:formatCode>
+                <c:ptCount val="1"/>
+                <c:pt idx="0">
+                  <c:v>199140000</c:v>
+                </c:pt>
+              </c:numCache>
+            </c:numRef>
+          </c:val>
+        </c:ser>
+        <c:dLbls>
+          <c:showLegendKey val="0"/>
+          <c:showVal val="0"/>
+          <c:showCatName val="0"/>
+          <c:showSerName val="0"/>
+          <c:showPercent val="0"/>
+          <c:showBubbleSize val="0"/>
+        </c:dLbls>
+        <c:gapWidth val="150"/>
+        <c:shape val="box"/>
+        <c:axId val="-1713980704"/>
+        <c:axId val="-1713985056"/>
+        <c:axId val="0"/>
+      </c:bar3DChart>
+      <c:catAx>
+        <c:axId val="-1713980704"/>
+        <c:scaling>
+          <c:orientation val="minMax"/>
+        </c:scaling>
+        <c:delete val="0"/>
+        <c:axPos val="b"/>
+        <c:numFmt formatCode="General" sourceLinked="1"/>
+        <c:majorTickMark val="none"/>
+        <c:minorTickMark val="none"/>
+        <c:tickLblPos val="nextTo"/>
+        <c:spPr>
+          <a:noFill/>
+          <a:ln>
+            <a:noFill/>
+          </a:ln>
+          <a:effectLst/>
+        </c:spPr>
+        <c:txPr>
+          <a:bodyPr rot="-60000000" spcFirstLastPara="1" vertOverflow="ellipsis" vert="horz" wrap="square" anchor="ctr" anchorCtr="1"/>
+          <a:lstStyle/>
+          <a:p>
+            <a:pPr>
+              <a:defRPr sz="900" b="0" i="0" u="none" strike="noStrike" kern="1200" baseline="0">
+                <a:solidFill>
+                  <a:schemeClr val="tx1">
+                    <a:lumMod val="65000"/>
+                    <a:lumOff val="35000"/>
+                  </a:schemeClr>
+                </a:solidFill>
+                <a:latin typeface="+mn-lt"/>
+                <a:ea typeface="+mn-ea"/>
+                <a:cs typeface="+mn-cs"/>
+              </a:defRPr>
+            </a:pPr>
+            <a:endParaRPr lang="sr-Latn-RS"/>
+          </a:p>
+        </c:txPr>
+        <c:crossAx val="-1713985056"/>
+        <c:crosses val="autoZero"/>
+        <c:auto val="1"/>
+        <c:lblAlgn val="ctr"/>
+        <c:lblOffset val="100"/>
+        <c:noMultiLvlLbl val="0"/>
+      </c:catAx>
+      <c:valAx>
+        <c:axId val="-1713985056"/>
+        <c:scaling>
+          <c:logBase val="10"/>
+          <c:orientation val="minMax"/>
+        </c:scaling>
+        <c:delete val="0"/>
+        <c:axPos val="l"/>
+        <c:majorGridlines>
+          <c:spPr>
+            <a:ln w="9525" cap="flat" cmpd="sng" algn="ctr">
+              <a:solidFill>
+                <a:schemeClr val="tx1">
+                  <a:lumMod val="15000"/>
+                  <a:lumOff val="85000"/>
+                </a:schemeClr>
+              </a:solidFill>
+              <a:round/>
+            </a:ln>
+            <a:effectLst/>
+          </c:spPr>
+        </c:majorGridlines>
+        <c:title>
+          <c:tx>
+            <c:rich>
+              <a:bodyPr rot="-5400000" spcFirstLastPara="1" vertOverflow="ellipsis" vert="horz" wrap="square" anchor="ctr" anchorCtr="1"/>
+              <a:lstStyle/>
+              <a:p>
+                <a:pPr>
+                  <a:defRPr sz="1000" b="0" i="0" u="none" strike="noStrike" kern="1200" baseline="0">
+                    <a:solidFill>
+                      <a:schemeClr val="tx1">
+                        <a:lumMod val="65000"/>
+                        <a:lumOff val="35000"/>
+                      </a:schemeClr>
+                    </a:solidFill>
+                    <a:latin typeface="+mn-lt"/>
+                    <a:ea typeface="+mn-ea"/>
+                    <a:cs typeface="+mn-cs"/>
+                  </a:defRPr>
+                </a:pPr>
+                <a:r>
+                  <a:rPr lang="en-GB" dirty="0" err="1" smtClean="0"/>
+                  <a:t>Memorija</a:t>
+                </a:r>
+                <a:r>
+                  <a:rPr lang="en-GB" dirty="0" smtClean="0"/>
+                  <a:t> </a:t>
+                </a:r>
+                <a:r>
+                  <a:rPr lang="en-GB" dirty="0"/>
+                  <a:t>[byte]</a:t>
+                </a:r>
+                <a:endParaRPr lang="hr-HR" dirty="0"/>
+              </a:p>
+            </c:rich>
+          </c:tx>
+          <c:overlay val="0"/>
+          <c:spPr>
+            <a:noFill/>
+            <a:ln>
+              <a:noFill/>
+            </a:ln>
+            <a:effectLst/>
+          </c:spPr>
+          <c:txPr>
+            <a:bodyPr rot="-5400000" spcFirstLastPara="1" vertOverflow="ellipsis" vert="horz" wrap="square" anchor="ctr" anchorCtr="1"/>
+            <a:lstStyle/>
+            <a:p>
+              <a:pPr>
+                <a:defRPr sz="1000" b="0" i="0" u="none" strike="noStrike" kern="1200" baseline="0">
+                  <a:solidFill>
+                    <a:schemeClr val="tx1">
+                      <a:lumMod val="65000"/>
+                      <a:lumOff val="35000"/>
+                    </a:schemeClr>
+                  </a:solidFill>
+                  <a:latin typeface="+mn-lt"/>
+                  <a:ea typeface="+mn-ea"/>
+                  <a:cs typeface="+mn-cs"/>
+                </a:defRPr>
+              </a:pPr>
+              <a:endParaRPr lang="sr-Latn-RS"/>
+            </a:p>
+          </c:txPr>
+        </c:title>
+        <c:numFmt formatCode="#,##0" sourceLinked="1"/>
+        <c:majorTickMark val="none"/>
+        <c:minorTickMark val="none"/>
+        <c:tickLblPos val="nextTo"/>
+        <c:spPr>
+          <a:noFill/>
+          <a:ln>
+            <a:noFill/>
+          </a:ln>
+          <a:effectLst/>
+        </c:spPr>
+        <c:txPr>
+          <a:bodyPr rot="-60000000" spcFirstLastPara="1" vertOverflow="ellipsis" vert="horz" wrap="square" anchor="ctr" anchorCtr="1"/>
+          <a:lstStyle/>
+          <a:p>
+            <a:pPr>
+              <a:defRPr sz="900" b="0" i="0" u="none" strike="noStrike" kern="1200" baseline="0">
+                <a:solidFill>
+                  <a:schemeClr val="tx1">
+                    <a:lumMod val="65000"/>
+                    <a:lumOff val="35000"/>
+                  </a:schemeClr>
+                </a:solidFill>
+                <a:latin typeface="+mn-lt"/>
+                <a:ea typeface="+mn-ea"/>
+                <a:cs typeface="+mn-cs"/>
+              </a:defRPr>
+            </a:pPr>
+            <a:endParaRPr lang="sr-Latn-RS"/>
+          </a:p>
+        </c:txPr>
+        <c:crossAx val="-1713980704"/>
+        <c:crosses val="autoZero"/>
+        <c:crossBetween val="between"/>
+      </c:valAx>
+      <c:dTable>
+        <c:showHorzBorder val="1"/>
+        <c:showVertBorder val="1"/>
+        <c:showOutline val="1"/>
+        <c:showKeys val="1"/>
+        <c:spPr>
+          <a:noFill/>
+          <a:ln w="9525" cap="flat" cmpd="sng" algn="ctr">
+            <a:solidFill>
+              <a:schemeClr val="tx1">
+                <a:lumMod val="15000"/>
+                <a:lumOff val="85000"/>
+              </a:schemeClr>
+            </a:solidFill>
+            <a:round/>
+          </a:ln>
+          <a:effectLst/>
+        </c:spPr>
+        <c:txPr>
+          <a:bodyPr rot="0" spcFirstLastPara="1" vertOverflow="ellipsis" vert="horz" wrap="square" anchor="ctr" anchorCtr="1"/>
+          <a:lstStyle/>
+          <a:p>
+            <a:pPr rtl="0">
+              <a:defRPr sz="900" b="0" i="0" u="none" strike="noStrike" kern="1200" baseline="0">
+                <a:solidFill>
+                  <a:schemeClr val="tx1">
+                    <a:lumMod val="65000"/>
+                    <a:lumOff val="35000"/>
+                  </a:schemeClr>
+                </a:solidFill>
+                <a:latin typeface="+mn-lt"/>
+                <a:ea typeface="+mn-ea"/>
+                <a:cs typeface="+mn-cs"/>
+              </a:defRPr>
+            </a:pPr>
+            <a:endParaRPr lang="sr-Latn-RS"/>
+          </a:p>
+        </c:txPr>
+      </c:dTable>
+      <c:spPr>
+        <a:noFill/>
+        <a:ln>
+          <a:noFill/>
+        </a:ln>
+        <a:effectLst/>
+      </c:spPr>
+    </c:plotArea>
+    <c:plotVisOnly val="1"/>
+    <c:dispBlanksAs val="gap"/>
+    <c:showDLblsOverMax val="0"/>
+  </c:chart>
+  <c:spPr>
+    <a:noFill/>
+    <a:ln>
+      <a:noFill/>
+    </a:ln>
+    <a:effectLst/>
+  </c:spPr>
+  <c:txPr>
+    <a:bodyPr/>
+    <a:lstStyle/>
+    <a:p>
+      <a:pPr>
+        <a:defRPr/>
+      </a:pPr>
+      <a:endParaRPr lang="sr-Latn-RS"/>
+    </a:p>
+  </c:txPr>
+  <c:externalData r:id="rId3">
+    <c:autoUpdate val="0"/>
+  </c:externalData>
+</c:chartSpace>
+</file>
+
+<file path=ppt/charts/colors1.xml><?xml version="1.0" encoding="utf-8"?>
+<cs:colorStyle xmlns:cs="http://schemas.microsoft.com/office/drawing/2012/chartStyle" xmlns:a="http://schemas.openxmlformats.org/drawingml/2006/main" meth="cycle" id="10">
+  <a:schemeClr val="accent1"/>
+  <a:schemeClr val="accent2"/>
+  <a:schemeClr val="accent3"/>
+  <a:schemeClr val="accent4"/>
+  <a:schemeClr val="accent5"/>
+  <a:schemeClr val="accent6"/>
+  <cs:variation/>
+  <cs:variation>
+    <a:lumMod val="60000"/>
+  </cs:variation>
+  <cs:variation>
+    <a:lumMod val="80000"/>
+    <a:lumOff val="20000"/>
+  </cs:variation>
+  <cs:variation>
+    <a:lumMod val="80000"/>
+  </cs:variation>
+  <cs:variation>
+    <a:lumMod val="60000"/>
+    <a:lumOff val="40000"/>
+  </cs:variation>
+  <cs:variation>
+    <a:lumMod val="50000"/>
+  </cs:variation>
+  <cs:variation>
+    <a:lumMod val="70000"/>
+    <a:lumOff val="30000"/>
+  </cs:variation>
+  <cs:variation>
+    <a:lumMod val="70000"/>
+  </cs:variation>
+  <cs:variation>
+    <a:lumMod val="50000"/>
+    <a:lumOff val="50000"/>
+  </cs:variation>
+</cs:colorStyle>
+</file>
+
+<file path=ppt/charts/colors2.xml><?xml version="1.0" encoding="utf-8"?>
+<cs:colorStyle xmlns:cs="http://schemas.microsoft.com/office/drawing/2012/chartStyle" xmlns:a="http://schemas.openxmlformats.org/drawingml/2006/main" meth="cycle" id="10">
+  <a:schemeClr val="accent1"/>
+  <a:schemeClr val="accent2"/>
+  <a:schemeClr val="accent3"/>
+  <a:schemeClr val="accent4"/>
+  <a:schemeClr val="accent5"/>
+  <a:schemeClr val="accent6"/>
+  <cs:variation/>
+  <cs:variation>
+    <a:lumMod val="60000"/>
+  </cs:variation>
+  <cs:variation>
+    <a:lumMod val="80000"/>
+    <a:lumOff val="20000"/>
+  </cs:variation>
+  <cs:variation>
+    <a:lumMod val="80000"/>
+  </cs:variation>
+  <cs:variation>
+    <a:lumMod val="60000"/>
+    <a:lumOff val="40000"/>
+  </cs:variation>
+  <cs:variation>
+    <a:lumMod val="50000"/>
+  </cs:variation>
+  <cs:variation>
+    <a:lumMod val="70000"/>
+    <a:lumOff val="30000"/>
+  </cs:variation>
+  <cs:variation>
+    <a:lumMod val="70000"/>
+  </cs:variation>
+  <cs:variation>
+    <a:lumMod val="50000"/>
+    <a:lumOff val="50000"/>
+  </cs:variation>
+</cs:colorStyle>
+</file>
+
+<file path=ppt/charts/style1.xml><?xml version="1.0" encoding="utf-8"?>
+<cs:chartStyle xmlns:cs="http://schemas.microsoft.com/office/drawing/2012/chartStyle" xmlns:a="http://schemas.openxmlformats.org/drawingml/2006/main" id="227">
+  <cs:axisTitle>
+    <cs:lnRef idx="0"/>
+    <cs:fillRef idx="0"/>
+    <cs:effectRef idx="0"/>
+    <cs:fontRef idx="minor">
+      <a:schemeClr val="tx1">
+        <a:lumMod val="65000"/>
+        <a:lumOff val="35000"/>
+      </a:schemeClr>
+    </cs:fontRef>
+    <cs:defRPr sz="1000" kern="1200"/>
+  </cs:axisTitle>
+  <cs:categoryAxis>
+    <cs:lnRef idx="0"/>
+    <cs:fillRef idx="0"/>
+    <cs:effectRef idx="0"/>
+    <cs:fontRef idx="minor">
+      <a:schemeClr val="tx1">
+        <a:lumMod val="65000"/>
+        <a:lumOff val="35000"/>
+      </a:schemeClr>
+    </cs:fontRef>
+    <cs:spPr>
+      <a:ln w="9525" cap="flat" cmpd="sng" algn="ctr">
+        <a:solidFill>
+          <a:schemeClr val="tx1">
+            <a:lumMod val="15000"/>
+            <a:lumOff val="85000"/>
+          </a:schemeClr>
+        </a:solidFill>
+        <a:round/>
+      </a:ln>
+    </cs:spPr>
+    <cs:defRPr sz="900" kern="1200"/>
+  </cs:categoryAxis>
+  <cs:chartArea mods="allowNoFillOverride allowNoLineOverride">
+    <cs:lnRef idx="0"/>
+    <cs:fillRef idx="0"/>
+    <cs:effectRef idx="0"/>
+    <cs:fontRef idx="minor">
+      <a:schemeClr val="tx1"/>
+    </cs:fontRef>
+    <cs:spPr>
+      <a:solidFill>
+        <a:schemeClr val="bg1"/>
+      </a:solidFill>
+      <a:ln w="9525" cap="flat" cmpd="sng" algn="ctr">
+        <a:solidFill>
+          <a:schemeClr val="tx1">
+            <a:lumMod val="15000"/>
+            <a:lumOff val="85000"/>
+          </a:schemeClr>
+        </a:solidFill>
+        <a:round/>
+      </a:ln>
+    </cs:spPr>
+    <cs:defRPr sz="1000" kern="1200"/>
+  </cs:chartArea>
+  <cs:dataLabel>
+    <cs:lnRef idx="0"/>
+    <cs:fillRef idx="0"/>
+    <cs:effectRef idx="0"/>
+    <cs:fontRef idx="minor">
+      <a:schemeClr val="tx1">
+        <a:lumMod val="75000"/>
+        <a:lumOff val="25000"/>
+      </a:schemeClr>
+    </cs:fontRef>
+    <cs:defRPr sz="900" kern="1200"/>
+  </cs:dataLabel>
+  <cs:dataLabelCallout>
+    <cs:lnRef idx="0"/>
+    <cs:fillRef idx="0"/>
+    <cs:effectRef idx="0"/>
+    <cs:fontRef idx="minor">
+      <a:schemeClr val="dk1">
+        <a:lumMod val="65000"/>
+        <a:lumOff val="35000"/>
+      </a:schemeClr>
+    </cs:fontRef>
+    <cs:spPr>
+      <a:solidFill>
+        <a:schemeClr val="lt1"/>
+      </a:solidFill>
+      <a:ln>
+        <a:solidFill>
+          <a:schemeClr val="dk1">
+            <a:lumMod val="25000"/>
+            <a:lumOff val="75000"/>
+          </a:schemeClr>
+        </a:solidFill>
+      </a:ln>
+    </cs:spPr>
+    <cs:defRPr sz="900" kern="1200"/>
+    <cs:bodyPr rot="0" spcFirstLastPara="1" vertOverflow="clip" horzOverflow="clip" vert="horz" wrap="square" lIns="36576" tIns="18288" rIns="36576" bIns="18288" anchor="ctr" anchorCtr="1">
+      <a:spAutoFit/>
+    </cs:bodyPr>
+  </cs:dataLabelCallout>
+  <cs:dataPoint>
+    <cs:lnRef idx="0"/>
+    <cs:fillRef idx="1">
+      <cs:styleClr val="auto"/>
+    </cs:fillRef>
+    <cs:effectRef idx="0"/>
+    <cs:fontRef idx="minor">
+      <a:schemeClr val="tx1"/>
+    </cs:fontRef>
+    <cs:spPr>
+      <a:solidFill>
+        <a:schemeClr val="phClr"/>
+      </a:solidFill>
+    </cs:spPr>
+  </cs:dataPoint>
+  <cs:dataPoint3D>
+    <cs:lnRef idx="0"/>
+    <cs:fillRef idx="1">
+      <cs:styleClr val="auto"/>
+    </cs:fillRef>
+    <cs:effectRef idx="0"/>
+    <cs:fontRef idx="minor">
+      <a:schemeClr val="tx1"/>
+    </cs:fontRef>
+    <cs:spPr>
+      <a:solidFill>
+        <a:schemeClr val="phClr"/>
+      </a:solidFill>
+    </cs:spPr>
+  </cs:dataPoint3D>
+  <cs:dataPointLine>
+    <cs:lnRef idx="0">
+      <cs:styleClr val="auto"/>
+    </cs:lnRef>
+    <cs:fillRef idx="1"/>
+    <cs:effectRef idx="0"/>
+    <cs:fontRef idx="minor">
+      <a:schemeClr val="tx1"/>
+    </cs:fontRef>
+    <cs:spPr>
+      <a:ln w="28575" cap="rnd">
+        <a:solidFill>
+          <a:schemeClr val="phClr"/>
+        </a:solidFill>
+        <a:round/>
+      </a:ln>
+    </cs:spPr>
+  </cs:dataPointLine>
+  <cs:dataPointMarker>
+    <cs:lnRef idx="0">
+      <cs:styleClr val="auto"/>
+    </cs:lnRef>
+    <cs:fillRef idx="1">
+      <cs:styleClr val="auto"/>
+    </cs:fillRef>
+    <cs:effectRef idx="0"/>
+    <cs:fontRef idx="minor">
+      <a:schemeClr val="tx1"/>
+    </cs:fontRef>
+    <cs:spPr>
+      <a:solidFill>
+        <a:schemeClr val="phClr"/>
+      </a:solidFill>
+      <a:ln w="9525">
+        <a:solidFill>
+          <a:schemeClr val="phClr"/>
+        </a:solidFill>
+      </a:ln>
+    </cs:spPr>
+  </cs:dataPointMarker>
+  <cs:dataPointMarkerLayout symbol="circle" size="5"/>
+  <cs:dataPointWireframe>
+    <cs:lnRef idx="0">
+      <cs:styleClr val="auto"/>
+    </cs:lnRef>
+    <cs:fillRef idx="1"/>
+    <cs:effectRef idx="0"/>
+    <cs:fontRef idx="minor">
+      <a:schemeClr val="tx1"/>
+    </cs:fontRef>
+    <cs:spPr>
+      <a:ln w="9525" cap="rnd">
+        <a:solidFill>
+          <a:schemeClr val="phClr"/>
+        </a:solidFill>
+        <a:round/>
+      </a:ln>
+    </cs:spPr>
+  </cs:dataPointWireframe>
+  <cs:dataTable>
+    <cs:lnRef idx="0"/>
+    <cs:fillRef idx="0"/>
+    <cs:effectRef idx="0"/>
+    <cs:fontRef idx="minor">
+      <a:schemeClr val="tx1">
+        <a:lumMod val="65000"/>
+        <a:lumOff val="35000"/>
+      </a:schemeClr>
+    </cs:fontRef>
+    <cs:spPr>
+      <a:noFill/>
+      <a:ln w="9525" cap="flat" cmpd="sng" algn="ctr">
+        <a:solidFill>
+          <a:schemeClr val="tx1">
+            <a:lumMod val="15000"/>
+            <a:lumOff val="85000"/>
+          </a:schemeClr>
+        </a:solidFill>
+        <a:round/>
+      </a:ln>
+    </cs:spPr>
+    <cs:defRPr sz="900" kern="1200"/>
+  </cs:dataTable>
+  <cs:downBar>
+    <cs:lnRef idx="0"/>
+    <cs:fillRef idx="0"/>
+    <cs:effectRef idx="0"/>
+    <cs:fontRef idx="minor">
+      <a:schemeClr val="dk1"/>
+    </cs:fontRef>
+    <cs:spPr>
+      <a:solidFill>
+        <a:schemeClr val="dk1">
+          <a:lumMod val="65000"/>
+          <a:lumOff val="35000"/>
+        </a:schemeClr>
+      </a:solidFill>
+      <a:ln w="9525">
+        <a:solidFill>
+          <a:schemeClr val="tx1">
+            <a:lumMod val="65000"/>
+            <a:lumOff val="35000"/>
+          </a:schemeClr>
+        </a:solidFill>
+      </a:ln>
+    </cs:spPr>
+  </cs:downBar>
+  <cs:dropLine>
+    <cs:lnRef idx="0"/>
+    <cs:fillRef idx="0"/>
+    <cs:effectRef idx="0"/>
+    <cs:fontRef idx="minor">
+      <a:schemeClr val="tx1"/>
+    </cs:fontRef>
+    <cs:spPr>
+      <a:ln w="9525" cap="flat" cmpd="sng" algn="ctr">
+        <a:solidFill>
+          <a:schemeClr val="tx1">
+            <a:lumMod val="35000"/>
+            <a:lumOff val="65000"/>
+          </a:schemeClr>
+        </a:solidFill>
+        <a:round/>
+      </a:ln>
+    </cs:spPr>
+  </cs:dropLine>
+  <cs:errorBar>
+    <cs:lnRef idx="0"/>
+    <cs:fillRef idx="0"/>
+    <cs:effectRef idx="0"/>
+    <cs:fontRef idx="minor">
+      <a:schemeClr val="tx1"/>
+    </cs:fontRef>
+    <cs:spPr>
+      <a:ln w="9525" cap="flat" cmpd="sng" algn="ctr">
+        <a:solidFill>
+          <a:schemeClr val="tx1">
+            <a:lumMod val="65000"/>
+            <a:lumOff val="35000"/>
+          </a:schemeClr>
+        </a:solidFill>
+        <a:round/>
+      </a:ln>
+    </cs:spPr>
+  </cs:errorBar>
+  <cs:floor>
+    <cs:lnRef idx="0"/>
+    <cs:fillRef idx="0"/>
+    <cs:effectRef idx="0"/>
+    <cs:fontRef idx="minor">
+      <a:schemeClr val="tx1"/>
+    </cs:fontRef>
+    <cs:spPr>
+      <a:noFill/>
+      <a:ln>
+        <a:noFill/>
+      </a:ln>
+    </cs:spPr>
+  </cs:floor>
+  <cs:gridlineMajor>
+    <cs:lnRef idx="0"/>
+    <cs:fillRef idx="0"/>
+    <cs:effectRef idx="0"/>
+    <cs:fontRef idx="minor">
+      <a:schemeClr val="tx1"/>
+    </cs:fontRef>
+    <cs:spPr>
+      <a:ln w="9525" cap="flat" cmpd="sng" algn="ctr">
+        <a:solidFill>
+          <a:schemeClr val="tx1">
+            <a:lumMod val="15000"/>
+            <a:lumOff val="85000"/>
+          </a:schemeClr>
+        </a:solidFill>
+        <a:round/>
+      </a:ln>
+    </cs:spPr>
+  </cs:gridlineMajor>
+  <cs:gridlineMinor>
+    <cs:lnRef idx="0"/>
+    <cs:fillRef idx="0"/>
+    <cs:effectRef idx="0"/>
+    <cs:fontRef idx="minor">
+      <a:schemeClr val="tx1"/>
+    </cs:fontRef>
+    <cs:spPr>
+      <a:ln w="9525" cap="flat" cmpd="sng" algn="ctr">
+        <a:solidFill>
+          <a:schemeClr val="tx1">
+            <a:lumMod val="5000"/>
+            <a:lumOff val="95000"/>
+          </a:schemeClr>
+        </a:solidFill>
+        <a:round/>
+      </a:ln>
+    </cs:spPr>
+  </cs:gridlineMinor>
+  <cs:hiLoLine>
+    <cs:lnRef idx="0"/>
+    <cs:fillRef idx="0"/>
+    <cs:effectRef idx="0"/>
+    <cs:fontRef idx="minor">
+      <a:schemeClr val="tx1"/>
+    </cs:fontRef>
+    <cs:spPr>
+      <a:ln w="9525" cap="flat" cmpd="sng" algn="ctr">
+        <a:solidFill>
+          <a:schemeClr val="tx1">
+            <a:lumMod val="75000"/>
+            <a:lumOff val="25000"/>
+          </a:schemeClr>
+        </a:solidFill>
+        <a:round/>
+      </a:ln>
+    </cs:spPr>
+  </cs:hiLoLine>
+  <cs:leaderLine>
+    <cs:lnRef idx="0"/>
+    <cs:fillRef idx="0"/>
+    <cs:effectRef idx="0"/>
+    <cs:fontRef idx="minor">
+      <a:schemeClr val="tx1"/>
+    </cs:fontRef>
+    <cs:spPr>
+      <a:ln w="9525" cap="flat" cmpd="sng" algn="ctr">
+        <a:solidFill>
+          <a:schemeClr val="tx1">
+            <a:lumMod val="35000"/>
+            <a:lumOff val="65000"/>
+          </a:schemeClr>
+        </a:solidFill>
+        <a:round/>
+      </a:ln>
+    </cs:spPr>
+  </cs:leaderLine>
+  <cs:legend>
+    <cs:lnRef idx="0"/>
+    <cs:fillRef idx="0"/>
+    <cs:effectRef idx="0"/>
+    <cs:fontRef idx="minor">
+      <a:schemeClr val="tx1">
+        <a:lumMod val="65000"/>
+        <a:lumOff val="35000"/>
+      </a:schemeClr>
+    </cs:fontRef>
+    <cs:defRPr sz="900" kern="1200"/>
+  </cs:legend>
+  <cs:plotArea mods="allowNoFillOverride allowNoLineOverride">
+    <cs:lnRef idx="0"/>
+    <cs:fillRef idx="0"/>
+    <cs:effectRef idx="0"/>
+    <cs:fontRef idx="minor">
+      <a:schemeClr val="tx1"/>
+    </cs:fontRef>
+  </cs:plotArea>
+  <cs:plotArea3D mods="allowNoFillOverride allowNoLineOverride">
+    <cs:lnRef idx="0"/>
+    <cs:fillRef idx="0"/>
+    <cs:effectRef idx="0"/>
+    <cs:fontRef idx="minor">
+      <a:schemeClr val="tx1"/>
+    </cs:fontRef>
+  </cs:plotArea3D>
+  <cs:seriesAxis>
+    <cs:lnRef idx="0"/>
+    <cs:fillRef idx="0"/>
+    <cs:effectRef idx="0"/>
+    <cs:fontRef idx="minor">
+      <a:schemeClr val="tx1">
+        <a:lumMod val="65000"/>
+        <a:lumOff val="35000"/>
+      </a:schemeClr>
+    </cs:fontRef>
+    <cs:defRPr sz="900" kern="1200"/>
+  </cs:seriesAxis>
+  <cs:seriesLine>
+    <cs:lnRef idx="0"/>
+    <cs:fillRef idx="0"/>
+    <cs:effectRef idx="0"/>
+    <cs:fontRef idx="minor">
+      <a:schemeClr val="tx1"/>
+    </cs:fontRef>
+    <cs:spPr>
+      <a:ln w="9525" cap="flat" cmpd="sng" algn="ctr">
+        <a:solidFill>
+          <a:schemeClr val="tx1">
+            <a:lumMod val="35000"/>
+            <a:lumOff val="65000"/>
+          </a:schemeClr>
+        </a:solidFill>
+        <a:round/>
+      </a:ln>
+    </cs:spPr>
+  </cs:seriesLine>
+  <cs:title>
+    <cs:lnRef idx="0"/>
+    <cs:fillRef idx="0"/>
+    <cs:effectRef idx="0"/>
+    <cs:fontRef idx="minor">
+      <a:schemeClr val="tx1">
+        <a:lumMod val="65000"/>
+        <a:lumOff val="35000"/>
+      </a:schemeClr>
+    </cs:fontRef>
+    <cs:defRPr sz="1400" b="0" kern="1200" spc="0" baseline="0"/>
+  </cs:title>
+  <cs:trendline>
+    <cs:lnRef idx="0">
+      <cs:styleClr val="auto"/>
+    </cs:lnRef>
+    <cs:fillRef idx="0"/>
+    <cs:effectRef idx="0"/>
+    <cs:fontRef idx="minor">
+      <a:schemeClr val="tx1"/>
+    </cs:fontRef>
+    <cs:spPr>
+      <a:ln w="19050" cap="rnd">
+        <a:solidFill>
+          <a:schemeClr val="phClr"/>
+        </a:solidFill>
+        <a:prstDash val="sysDot"/>
+      </a:ln>
+    </cs:spPr>
+  </cs:trendline>
+  <cs:trendlineLabel>
+    <cs:lnRef idx="0"/>
+    <cs:fillRef idx="0"/>
+    <cs:effectRef idx="0"/>
+    <cs:fontRef idx="minor">
+      <a:schemeClr val="tx1">
+        <a:lumMod val="65000"/>
+        <a:lumOff val="35000"/>
+      </a:schemeClr>
+    </cs:fontRef>
+    <cs:defRPr sz="900" kern="1200"/>
+  </cs:trendlineLabel>
+  <cs:upBar>
+    <cs:lnRef idx="0"/>
+    <cs:fillRef idx="0"/>
+    <cs:effectRef idx="0"/>
+    <cs:fontRef idx="minor">
+      <a:schemeClr val="dk1"/>
+    </cs:fontRef>
+    <cs:spPr>
+      <a:solidFill>
+        <a:schemeClr val="lt1"/>
+      </a:solidFill>
+      <a:ln w="9525">
+        <a:solidFill>
+          <a:schemeClr val="tx1">
+            <a:lumMod val="15000"/>
+            <a:lumOff val="85000"/>
+          </a:schemeClr>
+        </a:solidFill>
+      </a:ln>
+    </cs:spPr>
+  </cs:upBar>
+  <cs:valueAxis>
+    <cs:lnRef idx="0"/>
+    <cs:fillRef idx="0"/>
+    <cs:effectRef idx="0"/>
+    <cs:fontRef idx="minor">
+      <a:schemeClr val="tx1">
+        <a:lumMod val="65000"/>
+        <a:lumOff val="35000"/>
+      </a:schemeClr>
+    </cs:fontRef>
+    <cs:defRPr sz="900" kern="1200"/>
+  </cs:valueAxis>
+  <cs:wall>
+    <cs:lnRef idx="0"/>
+    <cs:fillRef idx="0"/>
+    <cs:effectRef idx="0"/>
+    <cs:fontRef idx="minor">
+      <a:schemeClr val="tx1"/>
+    </cs:fontRef>
+    <cs:spPr>
+      <a:noFill/>
+      <a:ln>
+        <a:noFill/>
+      </a:ln>
+    </cs:spPr>
+  </cs:wall>
+</cs:chartStyle>
+</file>
+
+<file path=ppt/charts/style2.xml><?xml version="1.0" encoding="utf-8"?>
+<cs:chartStyle xmlns:cs="http://schemas.microsoft.com/office/drawing/2012/chartStyle" xmlns:a="http://schemas.openxmlformats.org/drawingml/2006/main" id="286">
+  <cs:axisTitle>
+    <cs:lnRef idx="0"/>
+    <cs:fillRef idx="0"/>
+    <cs:effectRef idx="0"/>
+    <cs:fontRef idx="minor">
+      <a:schemeClr val="tx1">
+        <a:lumMod val="65000"/>
+        <a:lumOff val="35000"/>
+      </a:schemeClr>
+    </cs:fontRef>
+    <cs:defRPr sz="1000" kern="1200"/>
+  </cs:axisTitle>
+  <cs:categoryAxis>
+    <cs:lnRef idx="0"/>
+    <cs:fillRef idx="0"/>
+    <cs:effectRef idx="0"/>
+    <cs:fontRef idx="minor">
+      <a:schemeClr val="tx1">
+        <a:lumMod val="65000"/>
+        <a:lumOff val="35000"/>
+      </a:schemeClr>
+    </cs:fontRef>
+    <cs:defRPr sz="900" kern="1200"/>
+  </cs:categoryAxis>
+  <cs:chartArea mods="allowNoFillOverride allowNoLineOverride">
+    <cs:lnRef idx="0"/>
+    <cs:fillRef idx="0"/>
+    <cs:effectRef idx="0"/>
+    <cs:fontRef idx="minor">
+      <a:schemeClr val="tx1"/>
+    </cs:fontRef>
+    <cs:spPr>
+      <a:solidFill>
+        <a:schemeClr val="bg1"/>
+      </a:solidFill>
+      <a:ln w="9525" cap="flat" cmpd="sng" algn="ctr">
+        <a:solidFill>
+          <a:schemeClr val="tx1">
+            <a:lumMod val="15000"/>
+            <a:lumOff val="85000"/>
+          </a:schemeClr>
+        </a:solidFill>
+        <a:round/>
+      </a:ln>
+    </cs:spPr>
+    <cs:defRPr sz="1000" kern="1200"/>
+  </cs:chartArea>
+  <cs:dataLabel>
+    <cs:lnRef idx="0"/>
+    <cs:fillRef idx="0"/>
+    <cs:effectRef idx="0"/>
+    <cs:fontRef idx="minor">
+      <a:schemeClr val="tx1">
+        <a:lumMod val="75000"/>
+        <a:lumOff val="25000"/>
+      </a:schemeClr>
+    </cs:fontRef>
+    <cs:defRPr sz="900" kern="1200"/>
+  </cs:dataLabel>
+  <cs:dataLabelCallout>
+    <cs:lnRef idx="0"/>
+    <cs:fillRef idx="0"/>
+    <cs:effectRef idx="0"/>
+    <cs:fontRef idx="minor">
+      <a:schemeClr val="dk1">
+        <a:lumMod val="65000"/>
+        <a:lumOff val="35000"/>
+      </a:schemeClr>
+    </cs:fontRef>
+    <cs:spPr>
+      <a:solidFill>
+        <a:schemeClr val="lt1"/>
+      </a:solidFill>
+      <a:ln>
+        <a:solidFill>
+          <a:schemeClr val="dk1">
+            <a:lumMod val="25000"/>
+            <a:lumOff val="75000"/>
+          </a:schemeClr>
+        </a:solidFill>
+      </a:ln>
+    </cs:spPr>
+    <cs:defRPr sz="900" kern="1200"/>
+    <cs:bodyPr rot="0" spcFirstLastPara="1" vertOverflow="clip" horzOverflow="clip" vert="horz" wrap="square" lIns="36576" tIns="18288" rIns="36576" bIns="18288" anchor="ctr" anchorCtr="1">
+      <a:spAutoFit/>
+    </cs:bodyPr>
+  </cs:dataLabelCallout>
+  <cs:dataPoint>
+    <cs:lnRef idx="0"/>
+    <cs:fillRef idx="1">
+      <cs:styleClr val="auto"/>
+    </cs:fillRef>
+    <cs:effectRef idx="0"/>
+    <cs:fontRef idx="minor">
+      <a:schemeClr val="tx1"/>
+    </cs:fontRef>
+  </cs:dataPoint>
+  <cs:dataPoint3D>
+    <cs:lnRef idx="0"/>
+    <cs:fillRef idx="1">
+      <cs:styleClr val="auto"/>
+    </cs:fillRef>
+    <cs:effectRef idx="0"/>
+    <cs:fontRef idx="minor">
+      <a:schemeClr val="tx1"/>
+    </cs:fontRef>
+  </cs:dataPoint3D>
+  <cs:dataPointLine>
+    <cs:lnRef idx="0">
+      <cs:styleClr val="auto"/>
+    </cs:lnRef>
+    <cs:fillRef idx="1"/>
+    <cs:effectRef idx="0"/>
+    <cs:fontRef idx="minor">
+      <a:schemeClr val="tx1"/>
+    </cs:fontRef>
+    <cs:spPr>
+      <a:ln w="28575" cap="rnd">
+        <a:solidFill>
+          <a:schemeClr val="phClr"/>
+        </a:solidFill>
+        <a:round/>
+      </a:ln>
+    </cs:spPr>
+  </cs:dataPointLine>
+  <cs:dataPointMarker>
+    <cs:lnRef idx="0">
+      <cs:styleClr val="auto"/>
+    </cs:lnRef>
+    <cs:fillRef idx="1">
+      <cs:styleClr val="auto"/>
+    </cs:fillRef>
+    <cs:effectRef idx="0"/>
+    <cs:fontRef idx="minor">
+      <a:schemeClr val="tx1"/>
+    </cs:fontRef>
+    <cs:spPr>
+      <a:ln w="9525">
+        <a:solidFill>
+          <a:schemeClr val="phClr"/>
+        </a:solidFill>
+      </a:ln>
+    </cs:spPr>
+  </cs:dataPointMarker>
+  <cs:dataPointMarkerLayout symbol="circle" size="5"/>
+  <cs:dataPointWireframe>
+    <cs:lnRef idx="0">
+      <cs:styleClr val="auto"/>
+    </cs:lnRef>
+    <cs:fillRef idx="1"/>
+    <cs:effectRef idx="0"/>
+    <cs:fontRef idx="minor">
+      <a:schemeClr val="tx1"/>
+    </cs:fontRef>
+    <cs:spPr>
+      <a:ln w="9525" cap="rnd">
+        <a:solidFill>
+          <a:schemeClr val="phClr"/>
+        </a:solidFill>
+        <a:round/>
+      </a:ln>
+    </cs:spPr>
+  </cs:dataPointWireframe>
+  <cs:dataTable>
+    <cs:lnRef idx="0"/>
+    <cs:fillRef idx="0"/>
+    <cs:effectRef idx="0"/>
+    <cs:fontRef idx="minor">
+      <a:schemeClr val="tx1">
+        <a:lumMod val="65000"/>
+        <a:lumOff val="35000"/>
+      </a:schemeClr>
+    </cs:fontRef>
+    <cs:spPr>
+      <a:noFill/>
+      <a:ln w="9525" cap="flat" cmpd="sng" algn="ctr">
+        <a:solidFill>
+          <a:schemeClr val="tx1">
+            <a:lumMod val="15000"/>
+            <a:lumOff val="85000"/>
+          </a:schemeClr>
+        </a:solidFill>
+        <a:round/>
+      </a:ln>
+    </cs:spPr>
+    <cs:defRPr sz="900" kern="1200"/>
+  </cs:dataTable>
+  <cs:downBar>
+    <cs:lnRef idx="0"/>
+    <cs:fillRef idx="0"/>
+    <cs:effectRef idx="0"/>
+    <cs:fontRef idx="minor">
+      <a:schemeClr val="tx1"/>
+    </cs:fontRef>
+    <cs:spPr>
+      <a:solidFill>
+        <a:schemeClr val="dk1">
+          <a:lumMod val="75000"/>
+          <a:lumOff val="25000"/>
+        </a:schemeClr>
+      </a:solidFill>
+      <a:ln w="9525" cap="flat" cmpd="sng" algn="ctr">
+        <a:solidFill>
+          <a:schemeClr val="tx1">
+            <a:lumMod val="65000"/>
+            <a:lumOff val="35000"/>
+          </a:schemeClr>
+        </a:solidFill>
+        <a:round/>
+      </a:ln>
+    </cs:spPr>
+  </cs:downBar>
+  <cs:dropLine>
+    <cs:lnRef idx="0"/>
+    <cs:fillRef idx="0"/>
+    <cs:effectRef idx="0"/>
+    <cs:fontRef idx="minor">
+      <a:schemeClr val="tx1"/>
+    </cs:fontRef>
+    <cs:spPr>
+      <a:ln w="9525" cap="flat" cmpd="sng" algn="ctr">
+        <a:solidFill>
+          <a:schemeClr val="tx1">
+            <a:lumMod val="35000"/>
+            <a:lumOff val="65000"/>
+          </a:schemeClr>
+        </a:solidFill>
+        <a:round/>
+      </a:ln>
+    </cs:spPr>
+  </cs:dropLine>
+  <cs:errorBar>
+    <cs:lnRef idx="0"/>
+    <cs:fillRef idx="0"/>
+    <cs:effectRef idx="0"/>
+    <cs:fontRef idx="minor">
+      <a:schemeClr val="tx1"/>
+    </cs:fontRef>
+    <cs:spPr>
+      <a:ln w="9525" cap="flat" cmpd="sng" algn="ctr">
+        <a:solidFill>
+          <a:schemeClr val="tx1">
+            <a:lumMod val="65000"/>
+            <a:lumOff val="35000"/>
+          </a:schemeClr>
+        </a:solidFill>
+        <a:round/>
+      </a:ln>
+    </cs:spPr>
+  </cs:errorBar>
+  <cs:floor>
+    <cs:lnRef idx="0"/>
+    <cs:fillRef idx="0"/>
+    <cs:effectRef idx="0"/>
+    <cs:fontRef idx="minor">
+      <a:schemeClr val="tx1"/>
+    </cs:fontRef>
+    <cs:spPr>
+      <a:noFill/>
+      <a:ln>
+        <a:noFill/>
+      </a:ln>
+    </cs:spPr>
+  </cs:floor>
+  <cs:gridlineMajor>
+    <cs:lnRef idx="0"/>
+    <cs:fillRef idx="0"/>
+    <cs:effectRef idx="0"/>
+    <cs:fontRef idx="minor">
+      <a:schemeClr val="tx1"/>
+    </cs:fontRef>
+    <cs:spPr>
+      <a:ln w="9525" cap="flat" cmpd="sng" algn="ctr">
+        <a:solidFill>
+          <a:schemeClr val="tx1">
+            <a:lumMod val="15000"/>
+            <a:lumOff val="85000"/>
+          </a:schemeClr>
+        </a:solidFill>
+        <a:round/>
+      </a:ln>
+    </cs:spPr>
+  </cs:gridlineMajor>
+  <cs:gridlineMinor>
+    <cs:lnRef idx="0"/>
+    <cs:fillRef idx="0"/>
+    <cs:effectRef idx="0"/>
+    <cs:fontRef idx="minor">
+      <a:schemeClr val="tx1"/>
+    </cs:fontRef>
+    <cs:spPr>
+      <a:ln w="9525" cap="flat" cmpd="sng" algn="ctr">
+        <a:solidFill>
+          <a:schemeClr val="tx1">
+            <a:lumMod val="5000"/>
+            <a:lumOff val="95000"/>
+          </a:schemeClr>
+        </a:solidFill>
+        <a:round/>
+      </a:ln>
+    </cs:spPr>
+  </cs:gridlineMinor>
+  <cs:hiLoLine>
+    <cs:lnRef idx="0"/>
+    <cs:fillRef idx="0"/>
+    <cs:effectRef idx="0"/>
+    <cs:fontRef idx="minor">
+      <a:schemeClr val="tx1"/>
+    </cs:fontRef>
+    <cs:spPr>
+      <a:ln w="9525" cap="flat" cmpd="sng" algn="ctr">
+        <a:solidFill>
+          <a:schemeClr val="tx1">
+            <a:lumMod val="50000"/>
+            <a:lumOff val="50000"/>
+          </a:schemeClr>
+        </a:solidFill>
+        <a:round/>
+      </a:ln>
+    </cs:spPr>
+  </cs:hiLoLine>
+  <cs:leaderLine>
+    <cs:lnRef idx="0"/>
+    <cs:fillRef idx="0"/>
+    <cs:effectRef idx="0"/>
+    <cs:fontRef idx="minor">
+      <a:schemeClr val="tx1"/>
+    </cs:fontRef>
+    <cs:spPr>
+      <a:ln w="9525" cap="flat" cmpd="sng" algn="ctr">
+        <a:solidFill>
+          <a:schemeClr val="tx1">
+            <a:lumMod val="35000"/>
+            <a:lumOff val="65000"/>
+          </a:schemeClr>
+        </a:solidFill>
+        <a:round/>
+      </a:ln>
+    </cs:spPr>
+  </cs:leaderLine>
+  <cs:legend>
+    <cs:lnRef idx="0"/>
+    <cs:fillRef idx="0"/>
+    <cs:effectRef idx="0"/>
+    <cs:fontRef idx="minor">
+      <a:schemeClr val="tx1">
+        <a:lumMod val="65000"/>
+        <a:lumOff val="35000"/>
+      </a:schemeClr>
+    </cs:fontRef>
+    <cs:defRPr sz="900" kern="1200"/>
+  </cs:legend>
+  <cs:plotArea mods="allowNoFillOverride allowNoLineOverride">
+    <cs:lnRef idx="0"/>
+    <cs:fillRef idx="0"/>
+    <cs:effectRef idx="0"/>
+    <cs:fontRef idx="minor">
+      <a:schemeClr val="tx1"/>
+    </cs:fontRef>
+  </cs:plotArea>
+  <cs:plotArea3D mods="allowNoFillOverride allowNoLineOverride">
+    <cs:lnRef idx="0"/>
+    <cs:fillRef idx="0"/>
+    <cs:effectRef idx="0"/>
+    <cs:fontRef idx="minor">
+      <a:schemeClr val="tx1"/>
+    </cs:fontRef>
+  </cs:plotArea3D>
+  <cs:seriesAxis>
+    <cs:lnRef idx="0"/>
+    <cs:fillRef idx="0"/>
+    <cs:effectRef idx="0"/>
+    <cs:fontRef idx="minor">
+      <a:schemeClr val="tx1">
+        <a:lumMod val="65000"/>
+        <a:lumOff val="35000"/>
+      </a:schemeClr>
+    </cs:fontRef>
+    <cs:defRPr sz="900" kern="1200"/>
+  </cs:seriesAxis>
+  <cs:seriesLine>
+    <cs:lnRef idx="0"/>
+    <cs:fillRef idx="0"/>
+    <cs:effectRef idx="0"/>
+    <cs:fontRef idx="minor">
+      <a:schemeClr val="tx1"/>
+    </cs:fontRef>
+    <cs:spPr>
+      <a:ln w="9525" cap="flat" cmpd="sng" algn="ctr">
+        <a:solidFill>
+          <a:schemeClr val="tx1">
+            <a:lumMod val="35000"/>
+            <a:lumOff val="65000"/>
+          </a:schemeClr>
+        </a:solidFill>
+        <a:round/>
+      </a:ln>
+    </cs:spPr>
+  </cs:seriesLine>
+  <cs:title>
+    <cs:lnRef idx="0"/>
+    <cs:fillRef idx="0"/>
+    <cs:effectRef idx="0"/>
+    <cs:fontRef idx="minor">
+      <a:schemeClr val="tx1">
+        <a:lumMod val="65000"/>
+        <a:lumOff val="35000"/>
+      </a:schemeClr>
+    </cs:fontRef>
+    <cs:defRPr sz="1400" b="0" kern="1200" spc="0" baseline="0"/>
+  </cs:title>
+  <cs:trendline>
+    <cs:lnRef idx="0">
+      <cs:styleClr val="auto"/>
+    </cs:lnRef>
+    <cs:fillRef idx="0"/>
+    <cs:effectRef idx="0"/>
+    <cs:fontRef idx="minor">
+      <a:schemeClr val="tx1"/>
+    </cs:fontRef>
+    <cs:spPr>
+      <a:ln w="19050" cap="rnd">
+        <a:solidFill>
+          <a:schemeClr val="phClr"/>
+        </a:solidFill>
+        <a:prstDash val="sysDot"/>
+      </a:ln>
+    </cs:spPr>
+  </cs:trendline>
+  <cs:trendlineLabel>
+    <cs:lnRef idx="0"/>
+    <cs:fillRef idx="0"/>
+    <cs:effectRef idx="0"/>
+    <cs:fontRef idx="minor">
+      <a:schemeClr val="tx1">
+        <a:lumMod val="65000"/>
+        <a:lumOff val="35000"/>
+      </a:schemeClr>
+    </cs:fontRef>
+    <cs:defRPr sz="900" kern="1200"/>
+  </cs:trendlineLabel>
+  <cs:upBar>
+    <cs:lnRef idx="0"/>
+    <cs:fillRef idx="0"/>
+    <cs:effectRef idx="0"/>
+    <cs:fontRef idx="minor">
+      <a:schemeClr val="tx1"/>
+    </cs:fontRef>
+    <cs:spPr>
+      <a:solidFill>
+        <a:schemeClr val="lt1"/>
+      </a:solidFill>
+      <a:ln w="9525" cap="flat" cmpd="sng" algn="ctr">
+        <a:solidFill>
+          <a:schemeClr val="tx1">
+            <a:lumMod val="65000"/>
+            <a:lumOff val="35000"/>
+          </a:schemeClr>
+        </a:solidFill>
+        <a:round/>
+      </a:ln>
+    </cs:spPr>
+  </cs:upBar>
+  <cs:valueAxis>
+    <cs:lnRef idx="0"/>
+    <cs:fillRef idx="0"/>
+    <cs:effectRef idx="0"/>
+    <cs:fontRef idx="minor">
+      <a:schemeClr val="tx1">
+        <a:lumMod val="65000"/>
+        <a:lumOff val="35000"/>
+      </a:schemeClr>
+    </cs:fontRef>
+    <cs:defRPr sz="900" kern="1200"/>
+  </cs:valueAxis>
+  <cs:wall>
+    <cs:lnRef idx="0"/>
+    <cs:fillRef idx="0"/>
+    <cs:effectRef idx="0"/>
+    <cs:fontRef idx="minor">
+      <a:schemeClr val="tx1"/>
+    </cs:fontRef>
+    <cs:spPr>
+      <a:noFill/>
+      <a:ln>
+        <a:noFill/>
+      </a:ln>
+    </cs:spPr>
+  </cs:wall>
+</cs:chartStyle>
 </file>
 
 <file path=ppt/notesMasters/notesMaster1.xml><?xml version="1.0" encoding="utf-8"?>
@@ -202,7 +2322,7 @@
           <a:p>
             <a:fld id="{1F58DF50-7B36-4210-ADC3-7B28A651C4FA}" type="datetimeFigureOut">
               <a:rPr lang="en-US" smtClean="0"/>
-              <a:t>1/19/2015</a:t>
+              <a:t>1/21/2015</a:t>
             </a:fld>
             <a:endParaRPr lang="en-US"/>
           </a:p>
@@ -1277,7 +3397,7 @@
             <a:fld id="{B61BEF0D-F0BB-DE4B-95CE-6DB70DBA9567}" type="datetimeFigureOut">
               <a:rPr lang="en-US" dirty="0"/>
               <a:pPr/>
-              <a:t>1/19/2015</a:t>
+              <a:t>1/21/2015</a:t>
             </a:fld>
             <a:endParaRPr lang="en-US" dirty="0"/>
           </a:p>
@@ -1525,7 +3645,7 @@
             <a:fld id="{B61BEF0D-F0BB-DE4B-95CE-6DB70DBA9567}" type="datetimeFigureOut">
               <a:rPr lang="en-US" dirty="0"/>
               <a:pPr/>
-              <a:t>1/19/2015</a:t>
+              <a:t>1/21/2015</a:t>
             </a:fld>
             <a:endParaRPr lang="en-US" dirty="0"/>
           </a:p>
@@ -1836,7 +3956,7 @@
             <a:fld id="{B61BEF0D-F0BB-DE4B-95CE-6DB70DBA9567}" type="datetimeFigureOut">
               <a:rPr lang="en-US" dirty="0"/>
               <a:pPr/>
-              <a:t>1/19/2015</a:t>
+              <a:t>1/21/2015</a:t>
             </a:fld>
             <a:endParaRPr lang="en-US" dirty="0"/>
           </a:p>
@@ -2174,7 +4294,7 @@
             <a:fld id="{B61BEF0D-F0BB-DE4B-95CE-6DB70DBA9567}" type="datetimeFigureOut">
               <a:rPr lang="en-US" dirty="0"/>
               <a:pPr/>
-              <a:t>1/19/2015</a:t>
+              <a:t>1/21/2015</a:t>
             </a:fld>
             <a:endParaRPr lang="en-US" dirty="0"/>
           </a:p>
@@ -2485,7 +4605,7 @@
             <a:fld id="{B61BEF0D-F0BB-DE4B-95CE-6DB70DBA9567}" type="datetimeFigureOut">
               <a:rPr lang="en-US" dirty="0"/>
               <a:pPr/>
-              <a:t>1/19/2015</a:t>
+              <a:t>1/21/2015</a:t>
             </a:fld>
             <a:endParaRPr lang="en-US" dirty="0"/>
           </a:p>
@@ -2875,7 +4995,7 @@
             <a:fld id="{B61BEF0D-F0BB-DE4B-95CE-6DB70DBA9567}" type="datetimeFigureOut">
               <a:rPr lang="en-US" dirty="0"/>
               <a:pPr/>
-              <a:t>1/19/2015</a:t>
+              <a:t>1/21/2015</a:t>
             </a:fld>
             <a:endParaRPr lang="en-US" dirty="0"/>
           </a:p>
@@ -3041,7 +5161,7 @@
           <a:p>
             <a:fld id="{55C6B4A9-1611-4792-9094-5F34BCA07E0B}" type="datetimeFigureOut">
               <a:rPr lang="en-US" dirty="0"/>
-              <a:t>1/19/2015</a:t>
+              <a:t>1/21/2015</a:t>
             </a:fld>
             <a:endParaRPr lang="en-US" dirty="0"/>
           </a:p>
@@ -3217,7 +5337,7 @@
             <a:fld id="{B61BEF0D-F0BB-DE4B-95CE-6DB70DBA9567}" type="datetimeFigureOut">
               <a:rPr lang="en-US" dirty="0"/>
               <a:pPr/>
-              <a:t>1/19/2015</a:t>
+              <a:t>1/21/2015</a:t>
             </a:fld>
             <a:endParaRPr lang="en-US" dirty="0"/>
           </a:p>
@@ -3390,7 +5510,7 @@
             <a:fld id="{B61BEF0D-F0BB-DE4B-95CE-6DB70DBA9567}" type="datetimeFigureOut">
               <a:rPr lang="en-US" dirty="0"/>
               <a:pPr/>
-              <a:t>1/19/2015</a:t>
+              <a:t>1/21/2015</a:t>
             </a:fld>
             <a:endParaRPr lang="en-US" dirty="0"/>
           </a:p>
@@ -3634,7 +5754,7 @@
             <a:fld id="{B61BEF0D-F0BB-DE4B-95CE-6DB70DBA9567}" type="datetimeFigureOut">
               <a:rPr lang="en-US" dirty="0"/>
               <a:pPr/>
-              <a:t>1/19/2015</a:t>
+              <a:t>1/21/2015</a:t>
             </a:fld>
             <a:endParaRPr lang="en-US" dirty="0"/>
           </a:p>
@@ -3862,7 +5982,7 @@
           <a:p>
             <a:fld id="{EB712588-04B1-427B-82EE-E8DB90309F08}" type="datetimeFigureOut">
               <a:rPr lang="en-US" dirty="0"/>
-              <a:t>1/19/2015</a:t>
+              <a:t>1/21/2015</a:t>
             </a:fld>
             <a:endParaRPr lang="en-US" dirty="0"/>
           </a:p>
@@ -4232,7 +6352,7 @@
             <a:fld id="{B61BEF0D-F0BB-DE4B-95CE-6DB70DBA9567}" type="datetimeFigureOut">
               <a:rPr lang="en-US" dirty="0"/>
               <a:pPr/>
-              <a:t>1/19/2015</a:t>
+              <a:t>1/21/2015</a:t>
             </a:fld>
             <a:endParaRPr lang="en-US" dirty="0"/>
           </a:p>
@@ -4352,7 +6472,7 @@
             <a:fld id="{B61BEF0D-F0BB-DE4B-95CE-6DB70DBA9567}" type="datetimeFigureOut">
               <a:rPr lang="en-US" dirty="0"/>
               <a:pPr/>
-              <a:t>1/19/2015</a:t>
+              <a:t>1/21/2015</a:t>
             </a:fld>
             <a:endParaRPr lang="en-US" dirty="0"/>
           </a:p>
@@ -4444,7 +6564,7 @@
             <a:fld id="{B61BEF0D-F0BB-DE4B-95CE-6DB70DBA9567}" type="datetimeFigureOut">
               <a:rPr lang="en-US" dirty="0"/>
               <a:pPr/>
-              <a:t>1/19/2015</a:t>
+              <a:t>1/21/2015</a:t>
             </a:fld>
             <a:endParaRPr lang="en-US" dirty="0"/>
           </a:p>
@@ -4695,7 +6815,7 @@
           <a:p>
             <a:fld id="{42A54C80-263E-416B-A8E0-580EDEADCBDC}" type="datetimeFigureOut">
               <a:rPr lang="en-US" dirty="0"/>
-              <a:t>1/19/2015</a:t>
+              <a:t>1/21/2015</a:t>
             </a:fld>
             <a:endParaRPr lang="en-US" dirty="0"/>
           </a:p>
@@ -4954,7 +7074,7 @@
             <a:fld id="{B61BEF0D-F0BB-DE4B-95CE-6DB70DBA9567}" type="datetimeFigureOut">
               <a:rPr lang="en-US" dirty="0"/>
               <a:pPr/>
-              <a:t>1/19/2015</a:t>
+              <a:t>1/21/2015</a:t>
             </a:fld>
             <a:endParaRPr lang="en-US" dirty="0"/>
           </a:p>
@@ -5694,7 +7814,7 @@
             <a:fld id="{B61BEF0D-F0BB-DE4B-95CE-6DB70DBA9567}" type="datetimeFigureOut">
               <a:rPr lang="en-US" dirty="0"/>
               <a:pPr/>
-              <a:t>1/19/2015</a:t>
+              <a:t>1/21/2015</a:t>
             </a:fld>
             <a:endParaRPr lang="en-US" dirty="0"/>
           </a:p>
@@ -6239,10 +8359,6 @@
               <a:rPr lang="hr-HR" dirty="0" smtClean="0"/>
               <a:t>Bloom filter</a:t>
             </a:r>
-            <a:r>
-              <a:rPr lang="hr-HR" dirty="0" smtClean="0"/>
-              <a:t/>
-            </a:r>
             <a:br>
               <a:rPr lang="hr-HR" dirty="0" smtClean="0"/>
             </a:br>
@@ -6363,148 +8479,37 @@
           </a:p>
         </p:txBody>
       </p:sp>
-      <mc:AlternateContent xmlns:mc="http://schemas.openxmlformats.org/markup-compatibility/2006">
-        <mc:Choice xmlns:a14="http://schemas.microsoft.com/office/drawing/2010/main" Requires="a14">
-          <p:sp>
-            <p:nvSpPr>
-              <p:cNvPr id="3" name="Content Placeholder 2"/>
-              <p:cNvSpPr>
-                <a:spLocks noGrp="1"/>
-              </p:cNvSpPr>
-              <p:nvPr>
-                <p:ph idx="1"/>
-              </p:nvPr>
-            </p:nvSpPr>
-            <p:spPr/>
-            <p:txBody>
-              <a:bodyPr/>
-              <a:lstStyle/>
-              <a:p>
-                <a:r>
-                  <a:rPr lang="hr-HR" dirty="0" smtClean="0"/>
-                  <a:t>Ovisno o broju riječi koje planiramo dodati! Ako znamo unaprijed – super, inače po procjeni!</a:t>
-                </a:r>
-              </a:p>
-              <a:p>
-                <a:endParaRPr lang="hr-HR" dirty="0" smtClean="0"/>
-              </a:p>
-              <a:p>
-                <a:r>
-                  <a:rPr lang="hr-HR" dirty="0" smtClean="0"/>
-                  <a:t>Odredimo koliki postotak lažnih pozitivnih rezultata nam odgovara</a:t>
-                </a:r>
-              </a:p>
-              <a:p>
-                <a:endParaRPr lang="hr-HR" dirty="0"/>
-              </a:p>
-              <a:p>
-                <a14:m>
-                  <m:oMath xmlns:m="http://schemas.openxmlformats.org/officeDocument/2006/math">
-                    <m:r>
-                      <m:rPr>
-                        <m:sty m:val="p"/>
-                      </m:rPr>
-                      <a:rPr lang="en-US"/>
-                      <m:t>ceil</m:t>
-                    </m:r>
-                    <m:r>
-                      <a:rPr lang="en-US"/>
-                      <m:t>(</m:t>
-                    </m:r>
-                    <m:func>
-                      <m:funcPr>
-                        <m:ctrlPr>
-                          <a:rPr lang="en-US" i="1"/>
-                        </m:ctrlPr>
-                      </m:funcPr>
-                      <m:fName>
-                        <m:r>
-                          <m:rPr>
-                            <m:sty m:val="p"/>
-                          </m:rPr>
-                          <a:rPr lang="en-US"/>
-                          <m:t>ln</m:t>
-                        </m:r>
-                      </m:fName>
-                      <m:e>
-                        <m:f>
-                          <m:fPr>
-                            <m:ctrlPr>
-                              <a:rPr lang="en-US" i="1"/>
-                            </m:ctrlPr>
-                          </m:fPr>
-                          <m:num>
-                            <m:r>
-                              <a:rPr lang="en-US" i="1"/>
-                              <m:t>1</m:t>
-                            </m:r>
-                          </m:num>
-                          <m:den>
-                            <m:r>
-                              <a:rPr lang="en-US" i="1"/>
-                              <m:t>𝑝</m:t>
-                            </m:r>
-                          </m:den>
-                        </m:f>
-                      </m:e>
-                    </m:func>
-                    <m:r>
-                      <a:rPr lang="en-US" i="1"/>
-                      <m:t>)</m:t>
-                    </m:r>
-                  </m:oMath>
-                </a14:m>
-                <a:endParaRPr lang="hr-HR" dirty="0" smtClean="0"/>
-              </a:p>
-              <a:p>
-                <a:endParaRPr lang="hr-HR" dirty="0" smtClean="0"/>
-              </a:p>
-              <a:p>
-                <a:r>
-                  <a:rPr lang="hr-HR" dirty="0" smtClean="0"/>
-                  <a:t> </a:t>
-                </a:r>
-              </a:p>
-              <a:p>
-                <a:endParaRPr lang="en-US" dirty="0"/>
-              </a:p>
-            </p:txBody>
-          </p:sp>
-        </mc:Choice>
-        <mc:Fallback>
-          <p:sp>
-            <p:nvSpPr>
-              <p:cNvPr id="3" name="Content Placeholder 2"/>
-              <p:cNvSpPr>
-                <a:spLocks noGrp="1" noRot="1" noChangeAspect="1" noMove="1" noResize="1" noEditPoints="1" noAdjustHandles="1" noChangeArrowheads="1" noChangeShapeType="1" noTextEdit="1"/>
-              </p:cNvSpPr>
-              <p:nvPr>
-                <p:ph idx="1"/>
-              </p:nvPr>
-            </p:nvSpPr>
-            <p:spPr>
-              <a:blipFill rotWithShape="0">
-                <a:blip r:embed="rId2"/>
-                <a:stretch>
-                  <a:fillRect l="-142" t="-942"/>
-                </a:stretch>
-              </a:blipFill>
-            </p:spPr>
-            <p:txBody>
-              <a:bodyPr/>
-              <a:lstStyle/>
-              <a:p>
-                <a:r>
-                  <a:rPr lang="en-US">
-                    <a:noFill/>
-                  </a:rPr>
-                  <a:t> </a:t>
-                </a:r>
-              </a:p>
-            </p:txBody>
-          </p:sp>
-        </mc:Fallback>
-      </mc:AlternateContent>
+      <p:sp>
+        <p:nvSpPr>
+          <p:cNvPr id="3" name="Content Placeholder 2"/>
+          <p:cNvSpPr>
+            <a:spLocks noGrp="1"/>
+          </p:cNvSpPr>
+          <p:nvPr>
+            <p:ph idx="1"/>
+          </p:nvPr>
+        </p:nvSpPr>
+        <p:spPr/>
+        <p:txBody>
+          <a:bodyPr/>
+          <a:lstStyle/>
+          <a:p>
+            <a:r>
+              <a:rPr lang="hr-HR" dirty="0" smtClean="0"/>
+              <a:t>Ovisno o broju riječi koje planiramo dodati! Ako znamo unaprijed – super, inače po procjeni!</a:t>
+            </a:r>
+          </a:p>
+          <a:p>
+            <a:endParaRPr lang="hr-HR" dirty="0" smtClean="0"/>
+          </a:p>
+          <a:p>
+            <a:r>
+              <a:rPr lang="hr-HR" dirty="0" smtClean="0"/>
+              <a:t>Odredimo koliki postotak lažnih pozitivnih rezultata nam odgovara</a:t>
+            </a:r>
+          </a:p>
+        </p:txBody>
+      </p:sp>
       <p:pic>
         <p:nvPicPr>
           <p:cNvPr id="4" name="Picture 3"/>
@@ -6514,7 +8519,7 @@
           <p:nvPr/>
         </p:nvPicPr>
         <p:blipFill>
-          <a:blip r:embed="rId3"/>
+          <a:blip r:embed="rId2"/>
           <a:stretch>
             <a:fillRect/>
           </a:stretch>
@@ -6538,7 +8543,7 @@
           <p:nvPr/>
         </p:nvPicPr>
         <p:blipFill>
-          <a:blip r:embed="rId4"/>
+          <a:blip r:embed="rId3"/>
           <a:stretch>
             <a:fillRect/>
           </a:stretch>
@@ -6593,6 +8598,354 @@
             <p:ph type="title"/>
           </p:nvPr>
         </p:nvSpPr>
+        <p:spPr/>
+        <p:txBody>
+          <a:bodyPr/>
+          <a:lstStyle/>
+          <a:p>
+            <a:r>
+              <a:rPr lang="en-GB" dirty="0" err="1" smtClean="0"/>
+              <a:t>Ponašanje</a:t>
+            </a:r>
+            <a:r>
+              <a:rPr lang="en-GB" dirty="0" smtClean="0"/>
+              <a:t> Bloom </a:t>
+            </a:r>
+            <a:r>
+              <a:rPr lang="en-GB" dirty="0" err="1" smtClean="0"/>
+              <a:t>Filtra</a:t>
+            </a:r>
+            <a:endParaRPr lang="hr-HR" dirty="0"/>
+          </a:p>
+        </p:txBody>
+      </p:sp>
+      <p:pic>
+        <p:nvPicPr>
+          <p:cNvPr id="4" name="Picture 3"/>
+          <p:cNvPicPr>
+            <a:picLocks noChangeAspect="1"/>
+          </p:cNvPicPr>
+          <p:nvPr/>
+        </p:nvPicPr>
+        <p:blipFill>
+          <a:blip r:embed="rId2"/>
+          <a:stretch>
+            <a:fillRect/>
+          </a:stretch>
+        </p:blipFill>
+        <p:spPr>
+          <a:xfrm>
+            <a:off x="1065960" y="1660152"/>
+            <a:ext cx="7819415" cy="4493117"/>
+          </a:xfrm>
+          <a:prstGeom prst="rect">
+            <a:avLst/>
+          </a:prstGeom>
+        </p:spPr>
+      </p:pic>
+    </p:spTree>
+    <p:extLst>
+      <p:ext uri="{BB962C8B-B14F-4D97-AF65-F5344CB8AC3E}">
+        <p14:creationId xmlns:p14="http://schemas.microsoft.com/office/powerpoint/2010/main" val="3460731043"/>
+      </p:ext>
+    </p:extLst>
+  </p:cSld>
+  <p:clrMapOvr>
+    <a:masterClrMapping/>
+  </p:clrMapOvr>
+</p:sld>
+</file>
+
+<file path=ppt/slides/slide12.xml><?xml version="1.0" encoding="utf-8"?>
+<p:sld xmlns:a="http://schemas.openxmlformats.org/drawingml/2006/main" xmlns:r="http://schemas.openxmlformats.org/officeDocument/2006/relationships" xmlns:p="http://schemas.openxmlformats.org/presentationml/2006/main">
+  <p:cSld>
+    <p:spTree>
+      <p:nvGrpSpPr>
+        <p:cNvPr id="1" name=""/>
+        <p:cNvGrpSpPr/>
+        <p:nvPr/>
+      </p:nvGrpSpPr>
+      <p:grpSpPr>
+        <a:xfrm>
+          <a:off x="0" y="0"/>
+          <a:ext cx="0" cy="0"/>
+          <a:chOff x="0" y="0"/>
+          <a:chExt cx="0" cy="0"/>
+        </a:xfrm>
+      </p:grpSpPr>
+      <p:sp>
+        <p:nvSpPr>
+          <p:cNvPr id="2" name="Title 1"/>
+          <p:cNvSpPr>
+            <a:spLocks noGrp="1"/>
+          </p:cNvSpPr>
+          <p:nvPr>
+            <p:ph type="title"/>
+          </p:nvPr>
+        </p:nvSpPr>
+        <p:spPr/>
+        <p:txBody>
+          <a:bodyPr/>
+          <a:lstStyle/>
+          <a:p>
+            <a:r>
+              <a:rPr lang="en-GB" dirty="0" err="1"/>
+              <a:t>Ponašanje</a:t>
+            </a:r>
+            <a:r>
+              <a:rPr lang="en-GB" dirty="0"/>
+              <a:t> Bloom </a:t>
+            </a:r>
+            <a:r>
+              <a:rPr lang="en-GB" dirty="0" err="1"/>
+              <a:t>Filtra</a:t>
+            </a:r>
+            <a:endParaRPr lang="hr-HR" dirty="0"/>
+          </a:p>
+        </p:txBody>
+      </p:sp>
+      <p:pic>
+        <p:nvPicPr>
+          <p:cNvPr id="6" name="Picture 5"/>
+          <p:cNvPicPr>
+            <a:picLocks noChangeAspect="1"/>
+          </p:cNvPicPr>
+          <p:nvPr/>
+        </p:nvPicPr>
+        <p:blipFill>
+          <a:blip r:embed="rId2"/>
+          <a:stretch>
+            <a:fillRect/>
+          </a:stretch>
+        </p:blipFill>
+        <p:spPr>
+          <a:xfrm>
+            <a:off x="1138803" y="1622490"/>
+            <a:ext cx="7673729" cy="4498392"/>
+          </a:xfrm>
+          <a:prstGeom prst="rect">
+            <a:avLst/>
+          </a:prstGeom>
+        </p:spPr>
+      </p:pic>
+    </p:spTree>
+    <p:extLst>
+      <p:ext uri="{BB962C8B-B14F-4D97-AF65-F5344CB8AC3E}">
+        <p14:creationId xmlns:p14="http://schemas.microsoft.com/office/powerpoint/2010/main" val="770273359"/>
+      </p:ext>
+    </p:extLst>
+  </p:cSld>
+  <p:clrMapOvr>
+    <a:masterClrMapping/>
+  </p:clrMapOvr>
+</p:sld>
+</file>
+
+<file path=ppt/slides/slide13.xml><?xml version="1.0" encoding="utf-8"?>
+<p:sld xmlns:a="http://schemas.openxmlformats.org/drawingml/2006/main" xmlns:r="http://schemas.openxmlformats.org/officeDocument/2006/relationships" xmlns:p="http://schemas.openxmlformats.org/presentationml/2006/main">
+  <p:cSld>
+    <p:spTree>
+      <p:nvGrpSpPr>
+        <p:cNvPr id="1" name=""/>
+        <p:cNvGrpSpPr/>
+        <p:nvPr/>
+      </p:nvGrpSpPr>
+      <p:grpSpPr>
+        <a:xfrm>
+          <a:off x="0" y="0"/>
+          <a:ext cx="0" cy="0"/>
+          <a:chOff x="0" y="0"/>
+          <a:chExt cx="0" cy="0"/>
+        </a:xfrm>
+      </p:grpSpPr>
+      <p:sp>
+        <p:nvSpPr>
+          <p:cNvPr id="2" name="Title 1"/>
+          <p:cNvSpPr>
+            <a:spLocks noGrp="1"/>
+          </p:cNvSpPr>
+          <p:nvPr>
+            <p:ph type="title"/>
+          </p:nvPr>
+        </p:nvSpPr>
+        <p:spPr/>
+        <p:txBody>
+          <a:bodyPr/>
+          <a:lstStyle/>
+          <a:p>
+            <a:r>
+              <a:rPr lang="en-GB" dirty="0" err="1" smtClean="0"/>
+              <a:t>Usporedba</a:t>
+            </a:r>
+            <a:r>
+              <a:rPr lang="en-GB" dirty="0" smtClean="0"/>
+              <a:t> </a:t>
+            </a:r>
+            <a:r>
+              <a:rPr lang="en-GB" dirty="0" err="1" smtClean="0"/>
+              <a:t>performansi</a:t>
+            </a:r>
+            <a:endParaRPr lang="hr-HR" dirty="0"/>
+          </a:p>
+        </p:txBody>
+      </p:sp>
+      <p:graphicFrame>
+        <p:nvGraphicFramePr>
+          <p:cNvPr id="4" name="Chart 3"/>
+          <p:cNvGraphicFramePr>
+            <a:graphicFrameLocks/>
+          </p:cNvGraphicFramePr>
+          <p:nvPr>
+            <p:extLst>
+              <p:ext uri="{D42A27DB-BD31-4B8C-83A1-F6EECF244321}">
+                <p14:modId xmlns:p14="http://schemas.microsoft.com/office/powerpoint/2010/main" val="3350185614"/>
+              </p:ext>
+            </p:extLst>
+          </p:nvPr>
+        </p:nvGraphicFramePr>
+        <p:xfrm>
+          <a:off x="1423701" y="1623527"/>
+          <a:ext cx="7467746" cy="4599992"/>
+        </p:xfrm>
+        <a:graphic>
+          <a:graphicData uri="http://schemas.openxmlformats.org/drawingml/2006/chart">
+            <c:chart xmlns:c="http://schemas.openxmlformats.org/drawingml/2006/chart" xmlns:r="http://schemas.openxmlformats.org/officeDocument/2006/relationships" r:id="rId2"/>
+          </a:graphicData>
+        </a:graphic>
+      </p:graphicFrame>
+    </p:spTree>
+    <p:extLst>
+      <p:ext uri="{BB962C8B-B14F-4D97-AF65-F5344CB8AC3E}">
+        <p14:creationId xmlns:p14="http://schemas.microsoft.com/office/powerpoint/2010/main" val="2698874698"/>
+      </p:ext>
+    </p:extLst>
+  </p:cSld>
+  <p:clrMapOvr>
+    <a:masterClrMapping/>
+  </p:clrMapOvr>
+</p:sld>
+</file>
+
+<file path=ppt/slides/slide14.xml><?xml version="1.0" encoding="utf-8"?>
+<p:sld xmlns:a="http://schemas.openxmlformats.org/drawingml/2006/main" xmlns:r="http://schemas.openxmlformats.org/officeDocument/2006/relationships" xmlns:p="http://schemas.openxmlformats.org/presentationml/2006/main">
+  <p:cSld>
+    <p:spTree>
+      <p:nvGrpSpPr>
+        <p:cNvPr id="1" name=""/>
+        <p:cNvGrpSpPr/>
+        <p:nvPr/>
+      </p:nvGrpSpPr>
+      <p:grpSpPr>
+        <a:xfrm>
+          <a:off x="0" y="0"/>
+          <a:ext cx="0" cy="0"/>
+          <a:chOff x="0" y="0"/>
+          <a:chExt cx="0" cy="0"/>
+        </a:xfrm>
+      </p:grpSpPr>
+      <p:sp>
+        <p:nvSpPr>
+          <p:cNvPr id="2" name="Title 1"/>
+          <p:cNvSpPr>
+            <a:spLocks noGrp="1"/>
+          </p:cNvSpPr>
+          <p:nvPr>
+            <p:ph type="title"/>
+          </p:nvPr>
+        </p:nvSpPr>
+        <p:spPr/>
+        <p:txBody>
+          <a:bodyPr/>
+          <a:lstStyle/>
+          <a:p>
+            <a:r>
+              <a:rPr lang="en-GB" dirty="0" err="1" smtClean="0"/>
+              <a:t>Usporedba</a:t>
+            </a:r>
+            <a:r>
+              <a:rPr lang="en-GB" dirty="0" smtClean="0"/>
+              <a:t> </a:t>
+            </a:r>
+            <a:r>
+              <a:rPr lang="en-GB" dirty="0" err="1" smtClean="0"/>
+              <a:t>memorijskog</a:t>
+            </a:r>
+            <a:r>
+              <a:rPr lang="en-GB" dirty="0" smtClean="0"/>
+              <a:t> </a:t>
+            </a:r>
+            <a:r>
+              <a:rPr lang="en-GB" dirty="0" err="1" smtClean="0"/>
+              <a:t>zauzeća</a:t>
+            </a:r>
+            <a:endParaRPr lang="hr-HR" dirty="0"/>
+          </a:p>
+        </p:txBody>
+      </p:sp>
+      <p:graphicFrame>
+        <p:nvGraphicFramePr>
+          <p:cNvPr id="4" name="Chart 3"/>
+          <p:cNvGraphicFramePr>
+            <a:graphicFrameLocks/>
+          </p:cNvGraphicFramePr>
+          <p:nvPr>
+            <p:extLst>
+              <p:ext uri="{D42A27DB-BD31-4B8C-83A1-F6EECF244321}">
+                <p14:modId xmlns:p14="http://schemas.microsoft.com/office/powerpoint/2010/main" val="430803748"/>
+              </p:ext>
+            </p:extLst>
+          </p:nvPr>
+        </p:nvGraphicFramePr>
+        <p:xfrm>
+          <a:off x="1074235" y="1551603"/>
+          <a:ext cx="8107088" cy="4690576"/>
+        </p:xfrm>
+        <a:graphic>
+          <a:graphicData uri="http://schemas.openxmlformats.org/drawingml/2006/chart">
+            <c:chart xmlns:c="http://schemas.openxmlformats.org/drawingml/2006/chart" xmlns:r="http://schemas.openxmlformats.org/officeDocument/2006/relationships" r:id="rId2"/>
+          </a:graphicData>
+        </a:graphic>
+      </p:graphicFrame>
+    </p:spTree>
+    <p:extLst>
+      <p:ext uri="{BB962C8B-B14F-4D97-AF65-F5344CB8AC3E}">
+        <p14:creationId xmlns:p14="http://schemas.microsoft.com/office/powerpoint/2010/main" val="3630646974"/>
+      </p:ext>
+    </p:extLst>
+  </p:cSld>
+  <p:clrMapOvr>
+    <a:masterClrMapping/>
+  </p:clrMapOvr>
+</p:sld>
+</file>
+
+<file path=ppt/slides/slide15.xml><?xml version="1.0" encoding="utf-8"?>
+<p:sld xmlns:a="http://schemas.openxmlformats.org/drawingml/2006/main" xmlns:r="http://schemas.openxmlformats.org/officeDocument/2006/relationships" xmlns:p="http://schemas.openxmlformats.org/presentationml/2006/main">
+  <p:cSld>
+    <p:spTree>
+      <p:nvGrpSpPr>
+        <p:cNvPr id="1" name=""/>
+        <p:cNvGrpSpPr/>
+        <p:nvPr/>
+      </p:nvGrpSpPr>
+      <p:grpSpPr>
+        <a:xfrm>
+          <a:off x="0" y="0"/>
+          <a:ext cx="0" cy="0"/>
+          <a:chOff x="0" y="0"/>
+          <a:chExt cx="0" cy="0"/>
+        </a:xfrm>
+      </p:grpSpPr>
+      <p:sp>
+        <p:nvSpPr>
+          <p:cNvPr id="2" name="Title 1"/>
+          <p:cNvSpPr>
+            <a:spLocks noGrp="1"/>
+          </p:cNvSpPr>
+          <p:nvPr>
+            <p:ph type="title"/>
+          </p:nvPr>
+        </p:nvSpPr>
         <p:spPr>
           <a:xfrm>
             <a:off x="787503" y="2438400"/>
@@ -6907,7 +9260,6 @@
               <a:rPr lang="hr-HR" dirty="0" smtClean="0"/>
               <a:t>Dodajmo sada u njega riječ „bioinformatika”</a:t>
             </a:r>
-            <a:endParaRPr lang="hr-HR" dirty="0" smtClean="0"/>
           </a:p>
         </p:txBody>
       </p:sp>

</xml_diff>